<commit_message>
Adding a few slides to start off
</commit_message>
<xml_diff>
--- a/Presentation.pptx
+++ b/Presentation.pptx
@@ -8,6 +8,8 @@
     <p:sldId id="256" r:id="rId2"/>
     <p:sldId id="257" r:id="rId3"/>
     <p:sldId id="258" r:id="rId4"/>
+    <p:sldId id="259" r:id="rId5"/>
+    <p:sldId id="260" r:id="rId6"/>
   </p:sldIdLst>
   <p:sldSz cx="12192000" cy="6858000"/>
   <p:notesSz cx="6858000" cy="9144000"/>
@@ -106,6 +108,11 @@
       </a:defRPr>
     </a:lvl9pPr>
   </p:defaultTextStyle>
+  <p:extLst>
+    <p:ext uri="{EFAFB233-063F-42B5-8137-9DF3F51BA10A}">
+      <p15:sldGuideLst xmlns:p15="http://schemas.microsoft.com/office/powerpoint/2012/main"/>
+    </p:ext>
+  </p:extLst>
 </p:presentation>
 </file>
 
@@ -3576,7 +3583,10 @@
           <a:bodyPr/>
           <a:lstStyle/>
           <a:p>
-            <a:endParaRPr lang="en-US"/>
+            <a:r>
+              <a:rPr lang="en-US" dirty="0"/>
+              <a:t>What we used	</a:t>
+            </a:r>
           </a:p>
         </p:txBody>
       </p:sp>
@@ -3601,7 +3611,20 @@
           <a:bodyPr/>
           <a:lstStyle/>
           <a:p>
-            <a:endParaRPr lang="en-US"/>
+            <a:r>
+              <a:rPr lang="en-US" dirty="0"/>
+              <a:t>Boston crime dataset that is released by the government here. </a:t>
+            </a:r>
+            <a:r>
+              <a:rPr lang="en-US" dirty="0">
+                <a:hlinkClick r:id="rId2"/>
+              </a:rPr>
+              <a:t>https://data.boston.gov/dataset/crime-incident-reports-august-2015-to-date-source-new-system</a:t>
+            </a:r>
+            <a:endParaRPr lang="en-US" dirty="0"/>
+          </a:p>
+          <a:p>
+            <a:endParaRPr lang="en-US" dirty="0"/>
           </a:p>
         </p:txBody>
       </p:sp>
@@ -3609,6 +3632,162 @@
     <p:extLst>
       <p:ext uri="{BB962C8B-B14F-4D97-AF65-F5344CB8AC3E}">
         <p14:creationId xmlns:p14="http://schemas.microsoft.com/office/powerpoint/2010/main" val="3821859980"/>
+      </p:ext>
+    </p:extLst>
+  </p:cSld>
+  <p:clrMapOvr>
+    <a:masterClrMapping/>
+  </p:clrMapOvr>
+</p:sld>
+</file>
+
+<file path=ppt/slides/slide4.xml><?xml version="1.0" encoding="utf-8"?>
+<p:sld xmlns:a="http://schemas.openxmlformats.org/drawingml/2006/main" xmlns:r="http://schemas.openxmlformats.org/officeDocument/2006/relationships" xmlns:p="http://schemas.openxmlformats.org/presentationml/2006/main">
+  <p:cSld>
+    <p:spTree>
+      <p:nvGrpSpPr>
+        <p:cNvPr id="1" name=""/>
+        <p:cNvGrpSpPr/>
+        <p:nvPr/>
+      </p:nvGrpSpPr>
+      <p:grpSpPr>
+        <a:xfrm>
+          <a:off x="0" y="0"/>
+          <a:ext cx="0" cy="0"/>
+          <a:chOff x="0" y="0"/>
+          <a:chExt cx="0" cy="0"/>
+        </a:xfrm>
+      </p:grpSpPr>
+      <p:sp>
+        <p:nvSpPr>
+          <p:cNvPr id="2" name="Title 1">
+            <a:extLst>
+              <a:ext uri="{FF2B5EF4-FFF2-40B4-BE49-F238E27FC236}">
+                <a16:creationId xmlns:a16="http://schemas.microsoft.com/office/drawing/2014/main" id="{A64E4922-E7B7-4BA0-8AA6-69C936697140}"/>
+              </a:ext>
+            </a:extLst>
+          </p:cNvPr>
+          <p:cNvSpPr>
+            <a:spLocks noGrp="1"/>
+          </p:cNvSpPr>
+          <p:nvPr>
+            <p:ph type="title"/>
+          </p:nvPr>
+        </p:nvSpPr>
+        <p:spPr/>
+        <p:txBody>
+          <a:bodyPr/>
+          <a:lstStyle/>
+          <a:p>
+            <a:r>
+              <a:rPr lang="en-US" dirty="0"/>
+              <a:t>Crime data	</a:t>
+            </a:r>
+          </a:p>
+        </p:txBody>
+      </p:sp>
+      <p:sp>
+        <p:nvSpPr>
+          <p:cNvPr id="3" name="Content Placeholder 2">
+            <a:extLst>
+              <a:ext uri="{FF2B5EF4-FFF2-40B4-BE49-F238E27FC236}">
+                <a16:creationId xmlns:a16="http://schemas.microsoft.com/office/drawing/2014/main" id="{C0827257-DBC3-4050-81AD-F8062D9ADB8E}"/>
+              </a:ext>
+            </a:extLst>
+          </p:cNvPr>
+          <p:cNvSpPr>
+            <a:spLocks noGrp="1"/>
+          </p:cNvSpPr>
+          <p:nvPr>
+            <p:ph idx="1"/>
+          </p:nvPr>
+        </p:nvSpPr>
+        <p:spPr/>
+        <p:txBody>
+          <a:bodyPr/>
+          <a:lstStyle/>
+          <a:p>
+            <a:r>
+              <a:rPr lang="en-US" dirty="0"/>
+              <a:t>Why we chose this dataset?</a:t>
+            </a:r>
+          </a:p>
+          <a:p>
+            <a:r>
+              <a:rPr lang="en-US" dirty="0"/>
+              <a:t>Dataset description</a:t>
+            </a:r>
+          </a:p>
+          <a:p>
+            <a:endParaRPr lang="en-US" dirty="0"/>
+          </a:p>
+          <a:p>
+            <a:endParaRPr lang="en-US" dirty="0"/>
+          </a:p>
+        </p:txBody>
+      </p:sp>
+    </p:spTree>
+    <p:extLst>
+      <p:ext uri="{BB962C8B-B14F-4D97-AF65-F5344CB8AC3E}">
+        <p14:creationId xmlns:p14="http://schemas.microsoft.com/office/powerpoint/2010/main" val="1263831316"/>
+      </p:ext>
+    </p:extLst>
+  </p:cSld>
+  <p:clrMapOvr>
+    <a:masterClrMapping/>
+  </p:clrMapOvr>
+</p:sld>
+</file>
+
+<file path=ppt/slides/slide5.xml><?xml version="1.0" encoding="utf-8"?>
+<p:sld xmlns:a="http://schemas.openxmlformats.org/drawingml/2006/main" xmlns:r="http://schemas.openxmlformats.org/officeDocument/2006/relationships" xmlns:p="http://schemas.openxmlformats.org/presentationml/2006/main">
+  <p:cSld>
+    <p:spTree>
+      <p:nvGrpSpPr>
+        <p:cNvPr id="1" name=""/>
+        <p:cNvGrpSpPr/>
+        <p:nvPr/>
+      </p:nvGrpSpPr>
+      <p:grpSpPr>
+        <a:xfrm>
+          <a:off x="0" y="0"/>
+          <a:ext cx="0" cy="0"/>
+          <a:chOff x="0" y="0"/>
+          <a:chExt cx="0" cy="0"/>
+        </a:xfrm>
+      </p:grpSpPr>
+      <p:sp>
+        <p:nvSpPr>
+          <p:cNvPr id="2" name="Title 1">
+            <a:extLst>
+              <a:ext uri="{FF2B5EF4-FFF2-40B4-BE49-F238E27FC236}">
+                <a16:creationId xmlns:a16="http://schemas.microsoft.com/office/drawing/2014/main" id="{04B3C669-23D8-454D-B095-27B45BA8EE8C}"/>
+              </a:ext>
+            </a:extLst>
+          </p:cNvPr>
+          <p:cNvSpPr>
+            <a:spLocks noGrp="1"/>
+          </p:cNvSpPr>
+          <p:nvPr>
+            <p:ph type="ctrTitle"/>
+          </p:nvPr>
+        </p:nvSpPr>
+        <p:spPr/>
+        <p:txBody>
+          <a:bodyPr/>
+          <a:lstStyle/>
+          <a:p>
+            <a:r>
+              <a:rPr lang="en-US" dirty="0"/>
+              <a:t>Solution/Method</a:t>
+            </a:r>
+          </a:p>
+        </p:txBody>
+      </p:sp>
+    </p:spTree>
+    <p:extLst>
+      <p:ext uri="{BB962C8B-B14F-4D97-AF65-F5344CB8AC3E}">
+        <p14:creationId xmlns:p14="http://schemas.microsoft.com/office/powerpoint/2010/main" val="4076487023"/>
       </p:ext>
     </p:extLst>
   </p:cSld>

</xml_diff>

<commit_message>
adding new slides of evaluations
</commit_message>
<xml_diff>
--- a/Presentation.pptx
+++ b/Presentation.pptx
@@ -21,6 +21,17 @@
     <p:sldId id="269" r:id="rId15"/>
     <p:sldId id="270" r:id="rId16"/>
     <p:sldId id="271" r:id="rId17"/>
+    <p:sldId id="272" r:id="rId18"/>
+    <p:sldId id="273" r:id="rId19"/>
+    <p:sldId id="274" r:id="rId20"/>
+    <p:sldId id="275" r:id="rId21"/>
+    <p:sldId id="276" r:id="rId22"/>
+    <p:sldId id="277" r:id="rId23"/>
+    <p:sldId id="279" r:id="rId24"/>
+    <p:sldId id="281" r:id="rId25"/>
+    <p:sldId id="282" r:id="rId26"/>
+    <p:sldId id="283" r:id="rId27"/>
+    <p:sldId id="284" r:id="rId28"/>
   </p:sldIdLst>
   <p:sldSz cx="12192000" cy="6858000"/>
   <p:notesSz cx="6858000" cy="9144000"/>
@@ -8372,6 +8383,32 @@
 <file path=ppt/slides/slide16.xml><?xml version="1.0" encoding="utf-8"?>
 <p:sld xmlns:a="http://schemas.openxmlformats.org/drawingml/2006/main" xmlns:r="http://schemas.openxmlformats.org/officeDocument/2006/relationships" xmlns:p="http://schemas.openxmlformats.org/presentationml/2006/main">
   <p:cSld>
+    <p:bg>
+      <p:bgPr>
+        <a:gradFill rotWithShape="1">
+          <a:gsLst>
+            <a:gs pos="0">
+              <a:schemeClr val="bg2">
+                <a:tint val="90000"/>
+                <a:satMod val="92000"/>
+                <a:lumMod val="120000"/>
+              </a:schemeClr>
+            </a:gs>
+            <a:gs pos="100000">
+              <a:schemeClr val="bg2">
+                <a:shade val="98000"/>
+                <a:satMod val="120000"/>
+                <a:lumMod val="98000"/>
+              </a:schemeClr>
+            </a:gs>
+          </a:gsLst>
+          <a:path path="circle">
+            <a:fillToRect l="50000" t="50000" r="100000" b="100000"/>
+          </a:path>
+        </a:gradFill>
+        <a:effectLst/>
+      </p:bgPr>
+    </p:bg>
     <p:spTree>
       <p:nvGrpSpPr>
         <p:cNvPr id="1" name=""/>
@@ -8386,6 +8423,66 @@
           <a:chExt cx="0" cy="0"/>
         </a:xfrm>
       </p:grpSpPr>
+      <p:sp useBgFill="1">
+        <p:nvSpPr>
+          <p:cNvPr id="12" name="Rectangle 11">
+            <a:extLst>
+              <a:ext uri="{FF2B5EF4-FFF2-40B4-BE49-F238E27FC236}">
+                <a16:creationId xmlns:a16="http://schemas.microsoft.com/office/drawing/2014/main" id="{3F4C104D-5F30-4811-9376-566B26E4719A}"/>
+              </a:ext>
+              <a:ext uri="{C183D7F6-B498-43B3-948B-1728B52AA6E4}">
+                <adec:decorative xmlns:adec="http://schemas.microsoft.com/office/drawing/2017/decorative" val="1"/>
+              </a:ext>
+            </a:extLst>
+          </p:cNvPr>
+          <p:cNvSpPr>
+            <a:spLocks noGrp="1" noRot="1" noChangeAspect="1" noMove="1" noResize="1" noEditPoints="1" noAdjustHandles="1" noChangeArrowheads="1" noChangeShapeType="1" noTextEdit="1"/>
+          </p:cNvSpPr>
+          <p:nvPr>
+            <p:extLst>
+              <p:ext uri="{386F3935-93C4-4BCD-93E2-E3B085C9AB24}">
+                <p16:designElem xmlns:p16="http://schemas.microsoft.com/office/powerpoint/2015/main" val="1"/>
+              </p:ext>
+            </p:extLst>
+          </p:nvPr>
+        </p:nvSpPr>
+        <p:spPr>
+          <a:xfrm>
+            <a:off x="0" y="-786"/>
+            <a:ext cx="12192000" cy="6854038"/>
+          </a:xfrm>
+          <a:prstGeom prst="rect">
+            <a:avLst/>
+          </a:prstGeom>
+          <a:ln>
+            <a:noFill/>
+          </a:ln>
+        </p:spPr>
+        <p:style>
+          <a:lnRef idx="2">
+            <a:schemeClr val="accent1">
+              <a:shade val="50000"/>
+            </a:schemeClr>
+          </a:lnRef>
+          <a:fillRef idx="1">
+            <a:schemeClr val="accent1"/>
+          </a:fillRef>
+          <a:effectRef idx="0">
+            <a:schemeClr val="accent1"/>
+          </a:effectRef>
+          <a:fontRef idx="minor">
+            <a:schemeClr val="lt1"/>
+          </a:fontRef>
+        </p:style>
+        <p:txBody>
+          <a:bodyPr rtlCol="0" anchor="ctr"/>
+          <a:lstStyle/>
+          <a:p>
+            <a:pPr algn="ctr"/>
+            <a:endParaRPr lang="en-US"/>
+          </a:p>
+        </p:txBody>
+      </p:sp>
       <p:sp>
         <p:nvSpPr>
           <p:cNvPr id="2" name="Title 1">
@@ -8402,13 +8499,25 @@
             <p:ph type="title"/>
           </p:nvPr>
         </p:nvSpPr>
-        <p:spPr/>
-        <p:txBody>
-          <a:bodyPr/>
-          <a:lstStyle/>
-          <a:p>
-            <a:r>
-              <a:rPr lang="en-US" dirty="0"/>
+        <p:spPr>
+          <a:xfrm>
+            <a:off x="649224" y="645106"/>
+            <a:ext cx="3650279" cy="1259894"/>
+          </a:xfrm>
+        </p:spPr>
+        <p:txBody>
+          <a:bodyPr>
+            <a:normAutofit/>
+          </a:bodyPr>
+          <a:lstStyle/>
+          <a:p>
+            <a:pPr>
+              <a:lnSpc>
+                <a:spcPct val="90000"/>
+              </a:lnSpc>
+            </a:pPr>
+            <a:r>
+              <a:rPr lang="en-US" sz="2800"/>
               <a:t>Interesting statistics of crime data</a:t>
             </a:r>
           </a:p>
@@ -8416,26 +8525,337 @@
       </p:sp>
       <p:sp>
         <p:nvSpPr>
-          <p:cNvPr id="3" name="Content Placeholder 2">
+          <p:cNvPr id="14" name="Rectangle 13">
             <a:extLst>
               <a:ext uri="{FF2B5EF4-FFF2-40B4-BE49-F238E27FC236}">
-                <a16:creationId xmlns:a16="http://schemas.microsoft.com/office/drawing/2014/main" id="{4C9164DE-884A-4CD0-B45B-5DBCC0BBA993}"/>
+                <a16:creationId xmlns:a16="http://schemas.microsoft.com/office/drawing/2014/main" id="{0815E34B-5D02-4E01-A936-E8E1C0AB6F12}"/>
+              </a:ext>
+              <a:ext uri="{C183D7F6-B498-43B3-948B-1728B52AA6E4}">
+                <adec:decorative xmlns:adec="http://schemas.microsoft.com/office/drawing/2017/decorative" val="1"/>
               </a:ext>
             </a:extLst>
           </p:cNvPr>
           <p:cNvSpPr>
+            <a:spLocks noGrp="1" noRot="1" noChangeAspect="1" noMove="1" noResize="1" noEditPoints="1" noAdjustHandles="1" noChangeArrowheads="1" noChangeShapeType="1" noTextEdit="1"/>
+          </p:cNvSpPr>
+          <p:nvPr>
+            <p:extLst>
+              <p:ext uri="{386F3935-93C4-4BCD-93E2-E3B085C9AB24}">
+                <p16:designElem xmlns:p16="http://schemas.microsoft.com/office/powerpoint/2015/main" val="1"/>
+              </p:ext>
+            </p:extLst>
+          </p:nvPr>
+        </p:nvSpPr>
+        <p:spPr>
+          <a:xfrm>
+            <a:off x="0" y="0"/>
+            <a:ext cx="182880" cy="6858000"/>
+          </a:xfrm>
+          <a:prstGeom prst="rect">
+            <a:avLst/>
+          </a:prstGeom>
+          <a:solidFill>
+            <a:schemeClr val="tx2"/>
+          </a:solidFill>
+          <a:ln>
+            <a:noFill/>
+          </a:ln>
+          <a:effectLst/>
+        </p:spPr>
+        <p:style>
+          <a:lnRef idx="1">
+            <a:schemeClr val="accent1"/>
+          </a:lnRef>
+          <a:fillRef idx="3">
+            <a:schemeClr val="accent1"/>
+          </a:fillRef>
+          <a:effectRef idx="2">
+            <a:schemeClr val="accent1"/>
+          </a:effectRef>
+          <a:fontRef idx="minor">
+            <a:schemeClr val="lt1"/>
+          </a:fontRef>
+        </p:style>
+      </p:sp>
+      <p:sp>
+        <p:nvSpPr>
+          <p:cNvPr id="9" name="Content Placeholder 8">
+            <a:extLst>
+              <a:ext uri="{FF2B5EF4-FFF2-40B4-BE49-F238E27FC236}">
+                <a16:creationId xmlns:a16="http://schemas.microsoft.com/office/drawing/2014/main" id="{943C468A-B2D2-42C8-AFFC-B30DC0FCD539}"/>
+              </a:ext>
+            </a:extLst>
+          </p:cNvPr>
+          <p:cNvSpPr>
             <a:spLocks noGrp="1"/>
           </p:cNvSpPr>
           <p:nvPr>
             <p:ph idx="1"/>
           </p:nvPr>
         </p:nvSpPr>
-        <p:spPr/>
-        <p:txBody>
-          <a:bodyPr/>
-          <a:lstStyle/>
-          <a:p>
-            <a:endParaRPr lang="en-US" dirty="0"/>
+        <p:spPr>
+          <a:xfrm>
+            <a:off x="649225" y="2133600"/>
+            <a:ext cx="3650278" cy="3759253"/>
+          </a:xfrm>
+        </p:spPr>
+        <p:txBody>
+          <a:bodyPr>
+            <a:normAutofit/>
+          </a:bodyPr>
+          <a:lstStyle/>
+          <a:p>
+            <a:r>
+              <a:rPr lang="en-US" dirty="0"/>
+              <a:t>Part one crime statistics. </a:t>
+            </a:r>
+          </a:p>
+        </p:txBody>
+      </p:sp>
+      <p:pic>
+        <p:nvPicPr>
+          <p:cNvPr id="7" name="Content Placeholder 3">
+            <a:extLst>
+              <a:ext uri="{FF2B5EF4-FFF2-40B4-BE49-F238E27FC236}">
+                <a16:creationId xmlns:a16="http://schemas.microsoft.com/office/drawing/2014/main" id="{934D4000-3A73-472A-9A6C-5D6F3436A7E2}"/>
+              </a:ext>
+            </a:extLst>
+          </p:cNvPr>
+          <p:cNvPicPr>
+            <a:picLocks noChangeAspect="1"/>
+          </p:cNvPicPr>
+          <p:nvPr/>
+        </p:nvPicPr>
+        <p:blipFill>
+          <a:blip r:embed="rId2"/>
+          <a:stretch>
+            <a:fillRect/>
+          </a:stretch>
+        </p:blipFill>
+        <p:spPr>
+          <a:xfrm>
+            <a:off x="4619543" y="1206470"/>
+            <a:ext cx="6953577" cy="4119993"/>
+          </a:xfrm>
+          <a:prstGeom prst="rect">
+            <a:avLst/>
+          </a:prstGeom>
+        </p:spPr>
+      </p:pic>
+      <p:sp>
+        <p:nvSpPr>
+          <p:cNvPr id="16" name="Freeform 11">
+            <a:extLst>
+              <a:ext uri="{FF2B5EF4-FFF2-40B4-BE49-F238E27FC236}">
+                <a16:creationId xmlns:a16="http://schemas.microsoft.com/office/drawing/2014/main" id="{7DE3414B-B032-4710-A468-D3285E38C5FF}"/>
+              </a:ext>
+              <a:ext uri="{C183D7F6-B498-43B3-948B-1728B52AA6E4}">
+                <adec:decorative xmlns:adec="http://schemas.microsoft.com/office/drawing/2017/decorative" val="1"/>
+              </a:ext>
+            </a:extLst>
+          </p:cNvPr>
+          <p:cNvSpPr>
+            <a:spLocks noGrp="1" noRot="1" noChangeAspect="1" noMove="1" noResize="1" noEditPoints="1" noAdjustHandles="1" noChangeArrowheads="1" noChangeShapeType="1" noTextEdit="1"/>
+          </p:cNvSpPr>
+          <p:nvPr>
+            <p:extLst>
+              <p:ext uri="{386F3935-93C4-4BCD-93E2-E3B085C9AB24}">
+                <p16:designElem xmlns:p16="http://schemas.microsoft.com/office/powerpoint/2015/main" val="1"/>
+              </p:ext>
+            </p:extLst>
+          </p:nvPr>
+        </p:nvSpPr>
+        <p:spPr>
+          <a:xfrm>
+            <a:off x="-1" y="6061223"/>
+            <a:ext cx="1038036" cy="506277"/>
+          </a:xfrm>
+          <a:custGeom>
+            <a:avLst/>
+            <a:gdLst>
+              <a:gd name="connsiteX0" fmla="*/ 0 w 1038036"/>
+              <a:gd name="connsiteY0" fmla="*/ 0 h 506277"/>
+              <a:gd name="connsiteX1" fmla="*/ 182880 w 1038036"/>
+              <a:gd name="connsiteY1" fmla="*/ 0 h 506277"/>
+              <a:gd name="connsiteX2" fmla="*/ 291705 w 1038036"/>
+              <a:gd name="connsiteY2" fmla="*/ 0 h 506277"/>
+              <a:gd name="connsiteX3" fmla="*/ 291705 w 1038036"/>
+              <a:gd name="connsiteY3" fmla="*/ 151 h 506277"/>
+              <a:gd name="connsiteX4" fmla="*/ 692049 w 1038036"/>
+              <a:gd name="connsiteY4" fmla="*/ 705 h 506277"/>
+              <a:gd name="connsiteX5" fmla="*/ 782744 w 1038036"/>
+              <a:gd name="connsiteY5" fmla="*/ 705 h 506277"/>
+              <a:gd name="connsiteX6" fmla="*/ 797001 w 1038036"/>
+              <a:gd name="connsiteY6" fmla="*/ 5473 h 506277"/>
+              <a:gd name="connsiteX7" fmla="*/ 801982 w 1038036"/>
+              <a:gd name="connsiteY7" fmla="*/ 10242 h 506277"/>
+              <a:gd name="connsiteX8" fmla="*/ 1030951 w 1038036"/>
+              <a:gd name="connsiteY8" fmla="*/ 239185 h 506277"/>
+              <a:gd name="connsiteX9" fmla="*/ 1030951 w 1038036"/>
+              <a:gd name="connsiteY9" fmla="*/ 267797 h 506277"/>
+              <a:gd name="connsiteX10" fmla="*/ 801982 w 1038036"/>
+              <a:gd name="connsiteY10" fmla="*/ 496740 h 506277"/>
+              <a:gd name="connsiteX11" fmla="*/ 797001 w 1038036"/>
+              <a:gd name="connsiteY11" fmla="*/ 501508 h 506277"/>
+              <a:gd name="connsiteX12" fmla="*/ 782744 w 1038036"/>
+              <a:gd name="connsiteY12" fmla="*/ 506277 h 506277"/>
+              <a:gd name="connsiteX13" fmla="*/ 692049 w 1038036"/>
+              <a:gd name="connsiteY13" fmla="*/ 506277 h 506277"/>
+              <a:gd name="connsiteX14" fmla="*/ 291705 w 1038036"/>
+              <a:gd name="connsiteY14" fmla="*/ 505140 h 506277"/>
+              <a:gd name="connsiteX15" fmla="*/ 291705 w 1038036"/>
+              <a:gd name="connsiteY15" fmla="*/ 506277 h 506277"/>
+              <a:gd name="connsiteX16" fmla="*/ 0 w 1038036"/>
+              <a:gd name="connsiteY16" fmla="*/ 506277 h 506277"/>
+            </a:gdLst>
+            <a:ahLst/>
+            <a:cxnLst>
+              <a:cxn ang="0">
+                <a:pos x="connsiteX0" y="connsiteY0"/>
+              </a:cxn>
+              <a:cxn ang="0">
+                <a:pos x="connsiteX1" y="connsiteY1"/>
+              </a:cxn>
+              <a:cxn ang="0">
+                <a:pos x="connsiteX2" y="connsiteY2"/>
+              </a:cxn>
+              <a:cxn ang="0">
+                <a:pos x="connsiteX3" y="connsiteY3"/>
+              </a:cxn>
+              <a:cxn ang="0">
+                <a:pos x="connsiteX4" y="connsiteY4"/>
+              </a:cxn>
+              <a:cxn ang="0">
+                <a:pos x="connsiteX5" y="connsiteY5"/>
+              </a:cxn>
+              <a:cxn ang="0">
+                <a:pos x="connsiteX6" y="connsiteY6"/>
+              </a:cxn>
+              <a:cxn ang="0">
+                <a:pos x="connsiteX7" y="connsiteY7"/>
+              </a:cxn>
+              <a:cxn ang="0">
+                <a:pos x="connsiteX8" y="connsiteY8"/>
+              </a:cxn>
+              <a:cxn ang="0">
+                <a:pos x="connsiteX9" y="connsiteY9"/>
+              </a:cxn>
+              <a:cxn ang="0">
+                <a:pos x="connsiteX10" y="connsiteY10"/>
+              </a:cxn>
+              <a:cxn ang="0">
+                <a:pos x="connsiteX11" y="connsiteY11"/>
+              </a:cxn>
+              <a:cxn ang="0">
+                <a:pos x="connsiteX12" y="connsiteY12"/>
+              </a:cxn>
+              <a:cxn ang="0">
+                <a:pos x="connsiteX13" y="connsiteY13"/>
+              </a:cxn>
+              <a:cxn ang="0">
+                <a:pos x="connsiteX14" y="connsiteY14"/>
+              </a:cxn>
+              <a:cxn ang="0">
+                <a:pos x="connsiteX15" y="connsiteY15"/>
+              </a:cxn>
+              <a:cxn ang="0">
+                <a:pos x="connsiteX16" y="connsiteY16"/>
+              </a:cxn>
+            </a:cxnLst>
+            <a:rect l="l" t="t" r="r" b="b"/>
+            <a:pathLst>
+              <a:path w="1038036" h="506277">
+                <a:moveTo>
+                  <a:pt x="0" y="0"/>
+                </a:moveTo>
+                <a:lnTo>
+                  <a:pt x="182880" y="0"/>
+                </a:lnTo>
+                <a:lnTo>
+                  <a:pt x="291705" y="0"/>
+                </a:lnTo>
+                <a:lnTo>
+                  <a:pt x="291705" y="151"/>
+                </a:lnTo>
+                <a:lnTo>
+                  <a:pt x="692049" y="705"/>
+                </a:lnTo>
+                <a:lnTo>
+                  <a:pt x="782744" y="705"/>
+                </a:lnTo>
+                <a:cubicBezTo>
+                  <a:pt x="787553" y="705"/>
+                  <a:pt x="792363" y="5473"/>
+                  <a:pt x="797001" y="5473"/>
+                </a:cubicBezTo>
+                <a:cubicBezTo>
+                  <a:pt x="797001" y="10242"/>
+                  <a:pt x="801982" y="10242"/>
+                  <a:pt x="801982" y="10242"/>
+                </a:cubicBezTo>
+                <a:lnTo>
+                  <a:pt x="1030951" y="239185"/>
+                </a:lnTo>
+                <a:cubicBezTo>
+                  <a:pt x="1040398" y="248722"/>
+                  <a:pt x="1040398" y="258259"/>
+                  <a:pt x="1030951" y="267797"/>
+                </a:cubicBezTo>
+                <a:lnTo>
+                  <a:pt x="801982" y="496740"/>
+                </a:lnTo>
+                <a:cubicBezTo>
+                  <a:pt x="800436" y="498363"/>
+                  <a:pt x="798547" y="499885"/>
+                  <a:pt x="797001" y="501508"/>
+                </a:cubicBezTo>
+                <a:cubicBezTo>
+                  <a:pt x="792363" y="506277"/>
+                  <a:pt x="787553" y="506277"/>
+                  <a:pt x="782744" y="506277"/>
+                </a:cubicBezTo>
+                <a:lnTo>
+                  <a:pt x="692049" y="506277"/>
+                </a:lnTo>
+                <a:lnTo>
+                  <a:pt x="291705" y="505140"/>
+                </a:lnTo>
+                <a:lnTo>
+                  <a:pt x="291705" y="506277"/>
+                </a:lnTo>
+                <a:lnTo>
+                  <a:pt x="0" y="506277"/>
+                </a:lnTo>
+                <a:close/>
+              </a:path>
+            </a:pathLst>
+          </a:custGeom>
+          <a:ln>
+            <a:noFill/>
+          </a:ln>
+        </p:spPr>
+        <p:style>
+          <a:lnRef idx="2">
+            <a:schemeClr val="accent1">
+              <a:shade val="50000"/>
+            </a:schemeClr>
+          </a:lnRef>
+          <a:fillRef idx="1">
+            <a:schemeClr val="accent1"/>
+          </a:fillRef>
+          <a:effectRef idx="0">
+            <a:schemeClr val="accent1"/>
+          </a:effectRef>
+          <a:fontRef idx="minor">
+            <a:schemeClr val="lt1"/>
+          </a:fontRef>
+        </p:style>
+        <p:txBody>
+          <a:bodyPr rtlCol="0" anchor="ctr"/>
+          <a:lstStyle/>
+          <a:p>
+            <a:pPr algn="ctr"/>
+            <a:endParaRPr lang="en-US"/>
           </a:p>
         </p:txBody>
       </p:sp>
@@ -8443,6 +8863,670 @@
     <p:extLst>
       <p:ext uri="{BB962C8B-B14F-4D97-AF65-F5344CB8AC3E}">
         <p14:creationId xmlns:p14="http://schemas.microsoft.com/office/powerpoint/2010/main" val="2035697183"/>
+      </p:ext>
+    </p:extLst>
+  </p:cSld>
+  <p:clrMapOvr>
+    <a:masterClrMapping/>
+  </p:clrMapOvr>
+</p:sld>
+</file>
+
+<file path=ppt/slides/slide17.xml><?xml version="1.0" encoding="utf-8"?>
+<p:sld xmlns:a="http://schemas.openxmlformats.org/drawingml/2006/main" xmlns:r="http://schemas.openxmlformats.org/officeDocument/2006/relationships" xmlns:p="http://schemas.openxmlformats.org/presentationml/2006/main">
+  <p:cSld>
+    <p:bg>
+      <p:bgPr>
+        <a:gradFill rotWithShape="1">
+          <a:gsLst>
+            <a:gs pos="0">
+              <a:schemeClr val="bg2">
+                <a:tint val="90000"/>
+                <a:satMod val="92000"/>
+                <a:lumMod val="120000"/>
+              </a:schemeClr>
+            </a:gs>
+            <a:gs pos="100000">
+              <a:schemeClr val="bg2">
+                <a:shade val="98000"/>
+                <a:satMod val="120000"/>
+                <a:lumMod val="98000"/>
+              </a:schemeClr>
+            </a:gs>
+          </a:gsLst>
+          <a:path path="circle">
+            <a:fillToRect l="50000" t="50000" r="100000" b="100000"/>
+          </a:path>
+        </a:gradFill>
+        <a:effectLst/>
+      </p:bgPr>
+    </p:bg>
+    <p:spTree>
+      <p:nvGrpSpPr>
+        <p:cNvPr id="1" name=""/>
+        <p:cNvGrpSpPr/>
+        <p:nvPr/>
+      </p:nvGrpSpPr>
+      <p:grpSpPr>
+        <a:xfrm>
+          <a:off x="0" y="0"/>
+          <a:ext cx="0" cy="0"/>
+          <a:chOff x="0" y="0"/>
+          <a:chExt cx="0" cy="0"/>
+        </a:xfrm>
+      </p:grpSpPr>
+      <p:sp useBgFill="1">
+        <p:nvSpPr>
+          <p:cNvPr id="18" name="Rectangle 11">
+            <a:extLst>
+              <a:ext uri="{FF2B5EF4-FFF2-40B4-BE49-F238E27FC236}">
+                <a16:creationId xmlns:a16="http://schemas.microsoft.com/office/drawing/2014/main" id="{3F4C104D-5F30-4811-9376-566B26E4719A}"/>
+              </a:ext>
+              <a:ext uri="{C183D7F6-B498-43B3-948B-1728B52AA6E4}">
+                <adec:decorative xmlns:adec="http://schemas.microsoft.com/office/drawing/2017/decorative" val="1"/>
+              </a:ext>
+            </a:extLst>
+          </p:cNvPr>
+          <p:cNvSpPr>
+            <a:spLocks noGrp="1" noRot="1" noChangeAspect="1" noMove="1" noResize="1" noEditPoints="1" noAdjustHandles="1" noChangeArrowheads="1" noChangeShapeType="1" noTextEdit="1"/>
+          </p:cNvSpPr>
+          <p:nvPr>
+            <p:extLst>
+              <p:ext uri="{386F3935-93C4-4BCD-93E2-E3B085C9AB24}">
+                <p16:designElem xmlns:p16="http://schemas.microsoft.com/office/powerpoint/2015/main" val="1"/>
+              </p:ext>
+            </p:extLst>
+          </p:nvPr>
+        </p:nvSpPr>
+        <p:spPr>
+          <a:xfrm>
+            <a:off x="0" y="-786"/>
+            <a:ext cx="12192000" cy="6854038"/>
+          </a:xfrm>
+          <a:prstGeom prst="rect">
+            <a:avLst/>
+          </a:prstGeom>
+          <a:ln>
+            <a:noFill/>
+          </a:ln>
+        </p:spPr>
+        <p:style>
+          <a:lnRef idx="2">
+            <a:schemeClr val="accent1">
+              <a:shade val="50000"/>
+            </a:schemeClr>
+          </a:lnRef>
+          <a:fillRef idx="1">
+            <a:schemeClr val="accent1"/>
+          </a:fillRef>
+          <a:effectRef idx="0">
+            <a:schemeClr val="accent1"/>
+          </a:effectRef>
+          <a:fontRef idx="minor">
+            <a:schemeClr val="lt1"/>
+          </a:fontRef>
+        </p:style>
+        <p:txBody>
+          <a:bodyPr rtlCol="0" anchor="ctr"/>
+          <a:lstStyle/>
+          <a:p>
+            <a:pPr algn="ctr"/>
+            <a:endParaRPr lang="en-US"/>
+          </a:p>
+        </p:txBody>
+      </p:sp>
+      <p:sp>
+        <p:nvSpPr>
+          <p:cNvPr id="2" name="Title 1">
+            <a:extLst>
+              <a:ext uri="{FF2B5EF4-FFF2-40B4-BE49-F238E27FC236}">
+                <a16:creationId xmlns:a16="http://schemas.microsoft.com/office/drawing/2014/main" id="{F576F2BB-2C0B-4ABA-96C6-CF299A7D2B58}"/>
+              </a:ext>
+            </a:extLst>
+          </p:cNvPr>
+          <p:cNvSpPr>
+            <a:spLocks noGrp="1"/>
+          </p:cNvSpPr>
+          <p:nvPr>
+            <p:ph type="title"/>
+          </p:nvPr>
+        </p:nvSpPr>
+        <p:spPr>
+          <a:xfrm>
+            <a:off x="649224" y="645106"/>
+            <a:ext cx="3650279" cy="1259894"/>
+          </a:xfrm>
+        </p:spPr>
+        <p:txBody>
+          <a:bodyPr>
+            <a:normAutofit fontScale="90000"/>
+          </a:bodyPr>
+          <a:lstStyle/>
+          <a:p>
+            <a:r>
+              <a:rPr lang="en-US" dirty="0"/>
+              <a:t>Data according to districts.</a:t>
+            </a:r>
+          </a:p>
+        </p:txBody>
+      </p:sp>
+      <p:sp>
+        <p:nvSpPr>
+          <p:cNvPr id="19" name="Rectangle 13">
+            <a:extLst>
+              <a:ext uri="{FF2B5EF4-FFF2-40B4-BE49-F238E27FC236}">
+                <a16:creationId xmlns:a16="http://schemas.microsoft.com/office/drawing/2014/main" id="{0815E34B-5D02-4E01-A936-E8E1C0AB6F12}"/>
+              </a:ext>
+              <a:ext uri="{C183D7F6-B498-43B3-948B-1728B52AA6E4}">
+                <adec:decorative xmlns:adec="http://schemas.microsoft.com/office/drawing/2017/decorative" val="1"/>
+              </a:ext>
+            </a:extLst>
+          </p:cNvPr>
+          <p:cNvSpPr>
+            <a:spLocks noGrp="1" noRot="1" noChangeAspect="1" noMove="1" noResize="1" noEditPoints="1" noAdjustHandles="1" noChangeArrowheads="1" noChangeShapeType="1" noTextEdit="1"/>
+          </p:cNvSpPr>
+          <p:nvPr>
+            <p:extLst>
+              <p:ext uri="{386F3935-93C4-4BCD-93E2-E3B085C9AB24}">
+                <p16:designElem xmlns:p16="http://schemas.microsoft.com/office/powerpoint/2015/main" val="1"/>
+              </p:ext>
+            </p:extLst>
+          </p:nvPr>
+        </p:nvSpPr>
+        <p:spPr>
+          <a:xfrm>
+            <a:off x="0" y="0"/>
+            <a:ext cx="182880" cy="6858000"/>
+          </a:xfrm>
+          <a:prstGeom prst="rect">
+            <a:avLst/>
+          </a:prstGeom>
+          <a:solidFill>
+            <a:schemeClr val="tx2"/>
+          </a:solidFill>
+          <a:ln>
+            <a:noFill/>
+          </a:ln>
+          <a:effectLst/>
+        </p:spPr>
+        <p:style>
+          <a:lnRef idx="1">
+            <a:schemeClr val="accent1"/>
+          </a:lnRef>
+          <a:fillRef idx="3">
+            <a:schemeClr val="accent1"/>
+          </a:fillRef>
+          <a:effectRef idx="2">
+            <a:schemeClr val="accent1"/>
+          </a:effectRef>
+          <a:fontRef idx="minor">
+            <a:schemeClr val="lt1"/>
+          </a:fontRef>
+        </p:style>
+      </p:sp>
+      <p:pic>
+        <p:nvPicPr>
+          <p:cNvPr id="5" name="Content Placeholder 4">
+            <a:extLst>
+              <a:ext uri="{FF2B5EF4-FFF2-40B4-BE49-F238E27FC236}">
+                <a16:creationId xmlns:a16="http://schemas.microsoft.com/office/drawing/2014/main" id="{28FC3B61-1D71-4FED-9559-840DFC79455E}"/>
+              </a:ext>
+            </a:extLst>
+          </p:cNvPr>
+          <p:cNvPicPr>
+            <a:picLocks noGrp="1" noChangeAspect="1"/>
+          </p:cNvPicPr>
+          <p:nvPr>
+            <p:ph idx="1"/>
+          </p:nvPr>
+        </p:nvPicPr>
+        <p:blipFill>
+          <a:blip r:embed="rId2"/>
+          <a:stretch>
+            <a:fillRect/>
+          </a:stretch>
+        </p:blipFill>
+        <p:spPr>
+          <a:xfrm>
+            <a:off x="878377" y="2133600"/>
+            <a:ext cx="3191484" cy="3759200"/>
+          </a:xfrm>
+          <a:prstGeom prst="rect">
+            <a:avLst/>
+          </a:prstGeom>
+        </p:spPr>
+      </p:pic>
+      <p:pic>
+        <p:nvPicPr>
+          <p:cNvPr id="21" name="Content Placeholder 3">
+            <a:extLst>
+              <a:ext uri="{FF2B5EF4-FFF2-40B4-BE49-F238E27FC236}">
+                <a16:creationId xmlns:a16="http://schemas.microsoft.com/office/drawing/2014/main" id="{9AD146FB-39DD-461F-9BA7-914F5C3A20FD}"/>
+              </a:ext>
+            </a:extLst>
+          </p:cNvPr>
+          <p:cNvPicPr>
+            <a:picLocks noChangeAspect="1"/>
+          </p:cNvPicPr>
+          <p:nvPr/>
+        </p:nvPicPr>
+        <p:blipFill>
+          <a:blip r:embed="rId3"/>
+          <a:stretch>
+            <a:fillRect/>
+          </a:stretch>
+        </p:blipFill>
+        <p:spPr>
+          <a:xfrm>
+            <a:off x="4619543" y="1519381"/>
+            <a:ext cx="6953577" cy="3494171"/>
+          </a:xfrm>
+          <a:prstGeom prst="rect">
+            <a:avLst/>
+          </a:prstGeom>
+        </p:spPr>
+      </p:pic>
+      <p:sp>
+        <p:nvSpPr>
+          <p:cNvPr id="22" name="Freeform 11">
+            <a:extLst>
+              <a:ext uri="{FF2B5EF4-FFF2-40B4-BE49-F238E27FC236}">
+                <a16:creationId xmlns:a16="http://schemas.microsoft.com/office/drawing/2014/main" id="{7DE3414B-B032-4710-A468-D3285E38C5FF}"/>
+              </a:ext>
+              <a:ext uri="{C183D7F6-B498-43B3-948B-1728B52AA6E4}">
+                <adec:decorative xmlns:adec="http://schemas.microsoft.com/office/drawing/2017/decorative" val="1"/>
+              </a:ext>
+            </a:extLst>
+          </p:cNvPr>
+          <p:cNvSpPr>
+            <a:spLocks noGrp="1" noRot="1" noChangeAspect="1" noMove="1" noResize="1" noEditPoints="1" noAdjustHandles="1" noChangeArrowheads="1" noChangeShapeType="1" noTextEdit="1"/>
+          </p:cNvSpPr>
+          <p:nvPr>
+            <p:extLst>
+              <p:ext uri="{386F3935-93C4-4BCD-93E2-E3B085C9AB24}">
+                <p16:designElem xmlns:p16="http://schemas.microsoft.com/office/powerpoint/2015/main" val="1"/>
+              </p:ext>
+            </p:extLst>
+          </p:nvPr>
+        </p:nvSpPr>
+        <p:spPr>
+          <a:xfrm>
+            <a:off x="-1" y="6061223"/>
+            <a:ext cx="1038036" cy="506277"/>
+          </a:xfrm>
+          <a:custGeom>
+            <a:avLst/>
+            <a:gdLst>
+              <a:gd name="connsiteX0" fmla="*/ 0 w 1038036"/>
+              <a:gd name="connsiteY0" fmla="*/ 0 h 506277"/>
+              <a:gd name="connsiteX1" fmla="*/ 182880 w 1038036"/>
+              <a:gd name="connsiteY1" fmla="*/ 0 h 506277"/>
+              <a:gd name="connsiteX2" fmla="*/ 291705 w 1038036"/>
+              <a:gd name="connsiteY2" fmla="*/ 0 h 506277"/>
+              <a:gd name="connsiteX3" fmla="*/ 291705 w 1038036"/>
+              <a:gd name="connsiteY3" fmla="*/ 151 h 506277"/>
+              <a:gd name="connsiteX4" fmla="*/ 692049 w 1038036"/>
+              <a:gd name="connsiteY4" fmla="*/ 705 h 506277"/>
+              <a:gd name="connsiteX5" fmla="*/ 782744 w 1038036"/>
+              <a:gd name="connsiteY5" fmla="*/ 705 h 506277"/>
+              <a:gd name="connsiteX6" fmla="*/ 797001 w 1038036"/>
+              <a:gd name="connsiteY6" fmla="*/ 5473 h 506277"/>
+              <a:gd name="connsiteX7" fmla="*/ 801982 w 1038036"/>
+              <a:gd name="connsiteY7" fmla="*/ 10242 h 506277"/>
+              <a:gd name="connsiteX8" fmla="*/ 1030951 w 1038036"/>
+              <a:gd name="connsiteY8" fmla="*/ 239185 h 506277"/>
+              <a:gd name="connsiteX9" fmla="*/ 1030951 w 1038036"/>
+              <a:gd name="connsiteY9" fmla="*/ 267797 h 506277"/>
+              <a:gd name="connsiteX10" fmla="*/ 801982 w 1038036"/>
+              <a:gd name="connsiteY10" fmla="*/ 496740 h 506277"/>
+              <a:gd name="connsiteX11" fmla="*/ 797001 w 1038036"/>
+              <a:gd name="connsiteY11" fmla="*/ 501508 h 506277"/>
+              <a:gd name="connsiteX12" fmla="*/ 782744 w 1038036"/>
+              <a:gd name="connsiteY12" fmla="*/ 506277 h 506277"/>
+              <a:gd name="connsiteX13" fmla="*/ 692049 w 1038036"/>
+              <a:gd name="connsiteY13" fmla="*/ 506277 h 506277"/>
+              <a:gd name="connsiteX14" fmla="*/ 291705 w 1038036"/>
+              <a:gd name="connsiteY14" fmla="*/ 505140 h 506277"/>
+              <a:gd name="connsiteX15" fmla="*/ 291705 w 1038036"/>
+              <a:gd name="connsiteY15" fmla="*/ 506277 h 506277"/>
+              <a:gd name="connsiteX16" fmla="*/ 0 w 1038036"/>
+              <a:gd name="connsiteY16" fmla="*/ 506277 h 506277"/>
+            </a:gdLst>
+            <a:ahLst/>
+            <a:cxnLst>
+              <a:cxn ang="0">
+                <a:pos x="connsiteX0" y="connsiteY0"/>
+              </a:cxn>
+              <a:cxn ang="0">
+                <a:pos x="connsiteX1" y="connsiteY1"/>
+              </a:cxn>
+              <a:cxn ang="0">
+                <a:pos x="connsiteX2" y="connsiteY2"/>
+              </a:cxn>
+              <a:cxn ang="0">
+                <a:pos x="connsiteX3" y="connsiteY3"/>
+              </a:cxn>
+              <a:cxn ang="0">
+                <a:pos x="connsiteX4" y="connsiteY4"/>
+              </a:cxn>
+              <a:cxn ang="0">
+                <a:pos x="connsiteX5" y="connsiteY5"/>
+              </a:cxn>
+              <a:cxn ang="0">
+                <a:pos x="connsiteX6" y="connsiteY6"/>
+              </a:cxn>
+              <a:cxn ang="0">
+                <a:pos x="connsiteX7" y="connsiteY7"/>
+              </a:cxn>
+              <a:cxn ang="0">
+                <a:pos x="connsiteX8" y="connsiteY8"/>
+              </a:cxn>
+              <a:cxn ang="0">
+                <a:pos x="connsiteX9" y="connsiteY9"/>
+              </a:cxn>
+              <a:cxn ang="0">
+                <a:pos x="connsiteX10" y="connsiteY10"/>
+              </a:cxn>
+              <a:cxn ang="0">
+                <a:pos x="connsiteX11" y="connsiteY11"/>
+              </a:cxn>
+              <a:cxn ang="0">
+                <a:pos x="connsiteX12" y="connsiteY12"/>
+              </a:cxn>
+              <a:cxn ang="0">
+                <a:pos x="connsiteX13" y="connsiteY13"/>
+              </a:cxn>
+              <a:cxn ang="0">
+                <a:pos x="connsiteX14" y="connsiteY14"/>
+              </a:cxn>
+              <a:cxn ang="0">
+                <a:pos x="connsiteX15" y="connsiteY15"/>
+              </a:cxn>
+              <a:cxn ang="0">
+                <a:pos x="connsiteX16" y="connsiteY16"/>
+              </a:cxn>
+            </a:cxnLst>
+            <a:rect l="l" t="t" r="r" b="b"/>
+            <a:pathLst>
+              <a:path w="1038036" h="506277">
+                <a:moveTo>
+                  <a:pt x="0" y="0"/>
+                </a:moveTo>
+                <a:lnTo>
+                  <a:pt x="182880" y="0"/>
+                </a:lnTo>
+                <a:lnTo>
+                  <a:pt x="291705" y="0"/>
+                </a:lnTo>
+                <a:lnTo>
+                  <a:pt x="291705" y="151"/>
+                </a:lnTo>
+                <a:lnTo>
+                  <a:pt x="692049" y="705"/>
+                </a:lnTo>
+                <a:lnTo>
+                  <a:pt x="782744" y="705"/>
+                </a:lnTo>
+                <a:cubicBezTo>
+                  <a:pt x="787553" y="705"/>
+                  <a:pt x="792363" y="5473"/>
+                  <a:pt x="797001" y="5473"/>
+                </a:cubicBezTo>
+                <a:cubicBezTo>
+                  <a:pt x="797001" y="10242"/>
+                  <a:pt x="801982" y="10242"/>
+                  <a:pt x="801982" y="10242"/>
+                </a:cubicBezTo>
+                <a:lnTo>
+                  <a:pt x="1030951" y="239185"/>
+                </a:lnTo>
+                <a:cubicBezTo>
+                  <a:pt x="1040398" y="248722"/>
+                  <a:pt x="1040398" y="258259"/>
+                  <a:pt x="1030951" y="267797"/>
+                </a:cubicBezTo>
+                <a:lnTo>
+                  <a:pt x="801982" y="496740"/>
+                </a:lnTo>
+                <a:cubicBezTo>
+                  <a:pt x="800436" y="498363"/>
+                  <a:pt x="798547" y="499885"/>
+                  <a:pt x="797001" y="501508"/>
+                </a:cubicBezTo>
+                <a:cubicBezTo>
+                  <a:pt x="792363" y="506277"/>
+                  <a:pt x="787553" y="506277"/>
+                  <a:pt x="782744" y="506277"/>
+                </a:cubicBezTo>
+                <a:lnTo>
+                  <a:pt x="692049" y="506277"/>
+                </a:lnTo>
+                <a:lnTo>
+                  <a:pt x="291705" y="505140"/>
+                </a:lnTo>
+                <a:lnTo>
+                  <a:pt x="291705" y="506277"/>
+                </a:lnTo>
+                <a:lnTo>
+                  <a:pt x="0" y="506277"/>
+                </a:lnTo>
+                <a:close/>
+              </a:path>
+            </a:pathLst>
+          </a:custGeom>
+          <a:ln>
+            <a:noFill/>
+          </a:ln>
+        </p:spPr>
+        <p:style>
+          <a:lnRef idx="2">
+            <a:schemeClr val="accent1">
+              <a:shade val="50000"/>
+            </a:schemeClr>
+          </a:lnRef>
+          <a:fillRef idx="1">
+            <a:schemeClr val="accent1"/>
+          </a:fillRef>
+          <a:effectRef idx="0">
+            <a:schemeClr val="accent1"/>
+          </a:effectRef>
+          <a:fontRef idx="minor">
+            <a:schemeClr val="lt1"/>
+          </a:fontRef>
+        </p:style>
+        <p:txBody>
+          <a:bodyPr rtlCol="0" anchor="ctr"/>
+          <a:lstStyle/>
+          <a:p>
+            <a:pPr algn="ctr"/>
+            <a:endParaRPr lang="en-US"/>
+          </a:p>
+        </p:txBody>
+      </p:sp>
+    </p:spTree>
+    <p:extLst>
+      <p:ext uri="{BB962C8B-B14F-4D97-AF65-F5344CB8AC3E}">
+        <p14:creationId xmlns:p14="http://schemas.microsoft.com/office/powerpoint/2010/main" val="570062741"/>
+      </p:ext>
+    </p:extLst>
+  </p:cSld>
+  <p:clrMapOvr>
+    <a:masterClrMapping/>
+  </p:clrMapOvr>
+</p:sld>
+</file>
+
+<file path=ppt/slides/slide18.xml><?xml version="1.0" encoding="utf-8"?>
+<p:sld xmlns:a="http://schemas.openxmlformats.org/drawingml/2006/main" xmlns:r="http://schemas.openxmlformats.org/officeDocument/2006/relationships" xmlns:p="http://schemas.openxmlformats.org/presentationml/2006/main">
+  <p:cSld>
+    <p:spTree>
+      <p:nvGrpSpPr>
+        <p:cNvPr id="1" name=""/>
+        <p:cNvGrpSpPr/>
+        <p:nvPr/>
+      </p:nvGrpSpPr>
+      <p:grpSpPr>
+        <a:xfrm>
+          <a:off x="0" y="0"/>
+          <a:ext cx="0" cy="0"/>
+          <a:chOff x="0" y="0"/>
+          <a:chExt cx="0" cy="0"/>
+        </a:xfrm>
+      </p:grpSpPr>
+      <p:sp>
+        <p:nvSpPr>
+          <p:cNvPr id="2" name="Title 1">
+            <a:extLst>
+              <a:ext uri="{FF2B5EF4-FFF2-40B4-BE49-F238E27FC236}">
+                <a16:creationId xmlns:a16="http://schemas.microsoft.com/office/drawing/2014/main" id="{FBBD9B10-34E1-4676-89D2-08EC5571B4C4}"/>
+              </a:ext>
+            </a:extLst>
+          </p:cNvPr>
+          <p:cNvSpPr>
+            <a:spLocks noGrp="1"/>
+          </p:cNvSpPr>
+          <p:nvPr>
+            <p:ph type="title"/>
+          </p:nvPr>
+        </p:nvSpPr>
+        <p:spPr/>
+        <p:txBody>
+          <a:bodyPr/>
+          <a:lstStyle/>
+          <a:p>
+            <a:r>
+              <a:rPr lang="en-US" dirty="0"/>
+              <a:t>Top 10 unsafe streets.</a:t>
+            </a:r>
+          </a:p>
+        </p:txBody>
+      </p:sp>
+      <p:pic>
+        <p:nvPicPr>
+          <p:cNvPr id="4" name="Content Placeholder 3">
+            <a:extLst>
+              <a:ext uri="{FF2B5EF4-FFF2-40B4-BE49-F238E27FC236}">
+                <a16:creationId xmlns:a16="http://schemas.microsoft.com/office/drawing/2014/main" id="{4F339F43-4E6A-4652-ADC3-4B6BCEF733E0}"/>
+              </a:ext>
+            </a:extLst>
+          </p:cNvPr>
+          <p:cNvPicPr>
+            <a:picLocks noGrp="1" noChangeAspect="1"/>
+          </p:cNvPicPr>
+          <p:nvPr>
+            <p:ph idx="1"/>
+          </p:nvPr>
+        </p:nvPicPr>
+        <p:blipFill>
+          <a:blip r:embed="rId2"/>
+          <a:stretch>
+            <a:fillRect/>
+          </a:stretch>
+        </p:blipFill>
+        <p:spPr>
+          <a:xfrm>
+            <a:off x="2592925" y="2133600"/>
+            <a:ext cx="7838670" cy="3778250"/>
+          </a:xfrm>
+          <a:prstGeom prst="rect">
+            <a:avLst/>
+          </a:prstGeom>
+        </p:spPr>
+      </p:pic>
+    </p:spTree>
+    <p:extLst>
+      <p:ext uri="{BB962C8B-B14F-4D97-AF65-F5344CB8AC3E}">
+        <p14:creationId xmlns:p14="http://schemas.microsoft.com/office/powerpoint/2010/main" val="4259622861"/>
+      </p:ext>
+    </p:extLst>
+  </p:cSld>
+  <p:clrMapOvr>
+    <a:masterClrMapping/>
+  </p:clrMapOvr>
+</p:sld>
+</file>
+
+<file path=ppt/slides/slide19.xml><?xml version="1.0" encoding="utf-8"?>
+<p:sld xmlns:a="http://schemas.openxmlformats.org/drawingml/2006/main" xmlns:r="http://schemas.openxmlformats.org/officeDocument/2006/relationships" xmlns:p="http://schemas.openxmlformats.org/presentationml/2006/main">
+  <p:cSld>
+    <p:spTree>
+      <p:nvGrpSpPr>
+        <p:cNvPr id="1" name=""/>
+        <p:cNvGrpSpPr/>
+        <p:nvPr/>
+      </p:nvGrpSpPr>
+      <p:grpSpPr>
+        <a:xfrm>
+          <a:off x="0" y="0"/>
+          <a:ext cx="0" cy="0"/>
+          <a:chOff x="0" y="0"/>
+          <a:chExt cx="0" cy="0"/>
+        </a:xfrm>
+      </p:grpSpPr>
+      <p:sp>
+        <p:nvSpPr>
+          <p:cNvPr id="2" name="Title 1">
+            <a:extLst>
+              <a:ext uri="{FF2B5EF4-FFF2-40B4-BE49-F238E27FC236}">
+                <a16:creationId xmlns:a16="http://schemas.microsoft.com/office/drawing/2014/main" id="{2A066406-30BE-457E-AABB-1E650EC5BCF5}"/>
+              </a:ext>
+            </a:extLst>
+          </p:cNvPr>
+          <p:cNvSpPr>
+            <a:spLocks noGrp="1"/>
+          </p:cNvSpPr>
+          <p:nvPr>
+            <p:ph type="title"/>
+          </p:nvPr>
+        </p:nvSpPr>
+        <p:spPr/>
+        <p:txBody>
+          <a:bodyPr/>
+          <a:lstStyle/>
+          <a:p>
+            <a:r>
+              <a:rPr lang="en-US" dirty="0"/>
+              <a:t>Trend of crime over the years.</a:t>
+            </a:r>
+          </a:p>
+        </p:txBody>
+      </p:sp>
+      <p:pic>
+        <p:nvPicPr>
+          <p:cNvPr id="4" name="Content Placeholder 3">
+            <a:extLst>
+              <a:ext uri="{FF2B5EF4-FFF2-40B4-BE49-F238E27FC236}">
+                <a16:creationId xmlns:a16="http://schemas.microsoft.com/office/drawing/2014/main" id="{E1B18182-0BA0-4610-A960-380B26B05D7D}"/>
+              </a:ext>
+            </a:extLst>
+          </p:cNvPr>
+          <p:cNvPicPr>
+            <a:picLocks noGrp="1" noChangeAspect="1"/>
+          </p:cNvPicPr>
+          <p:nvPr>
+            <p:ph idx="1"/>
+          </p:nvPr>
+        </p:nvPicPr>
+        <p:blipFill>
+          <a:blip r:embed="rId2"/>
+          <a:stretch>
+            <a:fillRect/>
+          </a:stretch>
+        </p:blipFill>
+        <p:spPr>
+          <a:xfrm>
+            <a:off x="2592925" y="1905000"/>
+            <a:ext cx="8911687" cy="4006850"/>
+          </a:xfrm>
+          <a:prstGeom prst="rect">
+            <a:avLst/>
+          </a:prstGeom>
+        </p:spPr>
+      </p:pic>
+    </p:spTree>
+    <p:extLst>
+      <p:ext uri="{BB962C8B-B14F-4D97-AF65-F5344CB8AC3E}">
+        <p14:creationId xmlns:p14="http://schemas.microsoft.com/office/powerpoint/2010/main" val="1085450392"/>
       </p:ext>
     </p:extLst>
   </p:cSld>
@@ -8547,6 +9631,1249 @@
     <p:extLst>
       <p:ext uri="{BB962C8B-B14F-4D97-AF65-F5344CB8AC3E}">
         <p14:creationId xmlns:p14="http://schemas.microsoft.com/office/powerpoint/2010/main" val="2431192776"/>
+      </p:ext>
+    </p:extLst>
+  </p:cSld>
+  <p:clrMapOvr>
+    <a:masterClrMapping/>
+  </p:clrMapOvr>
+</p:sld>
+</file>
+
+<file path=ppt/slides/slide20.xml><?xml version="1.0" encoding="utf-8"?>
+<p:sld xmlns:a="http://schemas.openxmlformats.org/drawingml/2006/main" xmlns:r="http://schemas.openxmlformats.org/officeDocument/2006/relationships" xmlns:p="http://schemas.openxmlformats.org/presentationml/2006/main">
+  <p:cSld>
+    <p:spTree>
+      <p:nvGrpSpPr>
+        <p:cNvPr id="1" name=""/>
+        <p:cNvGrpSpPr/>
+        <p:nvPr/>
+      </p:nvGrpSpPr>
+      <p:grpSpPr>
+        <a:xfrm>
+          <a:off x="0" y="0"/>
+          <a:ext cx="0" cy="0"/>
+          <a:chOff x="0" y="0"/>
+          <a:chExt cx="0" cy="0"/>
+        </a:xfrm>
+      </p:grpSpPr>
+      <p:sp>
+        <p:nvSpPr>
+          <p:cNvPr id="2" name="Title 1">
+            <a:extLst>
+              <a:ext uri="{FF2B5EF4-FFF2-40B4-BE49-F238E27FC236}">
+                <a16:creationId xmlns:a16="http://schemas.microsoft.com/office/drawing/2014/main" id="{B77B6557-E4C3-4B5D-ACEE-ACCB2AD897E4}"/>
+              </a:ext>
+            </a:extLst>
+          </p:cNvPr>
+          <p:cNvSpPr>
+            <a:spLocks noGrp="1"/>
+          </p:cNvSpPr>
+          <p:nvPr>
+            <p:ph type="title"/>
+          </p:nvPr>
+        </p:nvSpPr>
+        <p:spPr/>
+        <p:txBody>
+          <a:bodyPr/>
+          <a:lstStyle/>
+          <a:p>
+            <a:r>
+              <a:rPr lang="en-US" dirty="0"/>
+              <a:t>Part one crime distribution among itself. </a:t>
+            </a:r>
+          </a:p>
+        </p:txBody>
+      </p:sp>
+      <p:pic>
+        <p:nvPicPr>
+          <p:cNvPr id="6" name="Content Placeholder 5">
+            <a:extLst>
+              <a:ext uri="{FF2B5EF4-FFF2-40B4-BE49-F238E27FC236}">
+                <a16:creationId xmlns:a16="http://schemas.microsoft.com/office/drawing/2014/main" id="{526CF55E-9A84-4CE4-912C-4E4E473A3AA5}"/>
+              </a:ext>
+            </a:extLst>
+          </p:cNvPr>
+          <p:cNvPicPr>
+            <a:picLocks noGrp="1" noChangeAspect="1"/>
+          </p:cNvPicPr>
+          <p:nvPr>
+            <p:ph idx="1"/>
+          </p:nvPr>
+        </p:nvPicPr>
+        <p:blipFill>
+          <a:blip r:embed="rId2"/>
+          <a:stretch>
+            <a:fillRect/>
+          </a:stretch>
+        </p:blipFill>
+        <p:spPr>
+          <a:xfrm>
+            <a:off x="4077478" y="2133600"/>
+            <a:ext cx="5364575" cy="3778250"/>
+          </a:xfrm>
+          <a:prstGeom prst="rect">
+            <a:avLst/>
+          </a:prstGeom>
+        </p:spPr>
+      </p:pic>
+    </p:spTree>
+    <p:extLst>
+      <p:ext uri="{BB962C8B-B14F-4D97-AF65-F5344CB8AC3E}">
+        <p14:creationId xmlns:p14="http://schemas.microsoft.com/office/powerpoint/2010/main" val="1167745890"/>
+      </p:ext>
+    </p:extLst>
+  </p:cSld>
+  <p:clrMapOvr>
+    <a:masterClrMapping/>
+  </p:clrMapOvr>
+</p:sld>
+</file>
+
+<file path=ppt/slides/slide21.xml><?xml version="1.0" encoding="utf-8"?>
+<p:sld xmlns:a="http://schemas.openxmlformats.org/drawingml/2006/main" xmlns:r="http://schemas.openxmlformats.org/officeDocument/2006/relationships" xmlns:p="http://schemas.openxmlformats.org/presentationml/2006/main">
+  <p:cSld>
+    <p:spTree>
+      <p:nvGrpSpPr>
+        <p:cNvPr id="1" name=""/>
+        <p:cNvGrpSpPr/>
+        <p:nvPr/>
+      </p:nvGrpSpPr>
+      <p:grpSpPr>
+        <a:xfrm>
+          <a:off x="0" y="0"/>
+          <a:ext cx="0" cy="0"/>
+          <a:chOff x="0" y="0"/>
+          <a:chExt cx="0" cy="0"/>
+        </a:xfrm>
+      </p:grpSpPr>
+      <p:sp>
+        <p:nvSpPr>
+          <p:cNvPr id="2" name="Title 1">
+            <a:extLst>
+              <a:ext uri="{FF2B5EF4-FFF2-40B4-BE49-F238E27FC236}">
+                <a16:creationId xmlns:a16="http://schemas.microsoft.com/office/drawing/2014/main" id="{D4DB1664-676A-40DE-B775-5BDE91024AFD}"/>
+              </a:ext>
+            </a:extLst>
+          </p:cNvPr>
+          <p:cNvSpPr>
+            <a:spLocks noGrp="1"/>
+          </p:cNvSpPr>
+          <p:nvPr>
+            <p:ph type="title"/>
+          </p:nvPr>
+        </p:nvSpPr>
+        <p:spPr/>
+        <p:txBody>
+          <a:bodyPr/>
+          <a:lstStyle/>
+          <a:p>
+            <a:r>
+              <a:rPr lang="en-US" dirty="0"/>
+              <a:t>Crimes on which day of the week?</a:t>
+            </a:r>
+          </a:p>
+        </p:txBody>
+      </p:sp>
+      <p:pic>
+        <p:nvPicPr>
+          <p:cNvPr id="4" name="Content Placeholder 3">
+            <a:extLst>
+              <a:ext uri="{FF2B5EF4-FFF2-40B4-BE49-F238E27FC236}">
+                <a16:creationId xmlns:a16="http://schemas.microsoft.com/office/drawing/2014/main" id="{4D0BB58B-F79E-46FC-ABBF-6F474DCD01D5}"/>
+              </a:ext>
+            </a:extLst>
+          </p:cNvPr>
+          <p:cNvPicPr>
+            <a:picLocks noGrp="1" noChangeAspect="1"/>
+          </p:cNvPicPr>
+          <p:nvPr>
+            <p:ph idx="1"/>
+          </p:nvPr>
+        </p:nvPicPr>
+        <p:blipFill>
+          <a:blip r:embed="rId2"/>
+          <a:stretch>
+            <a:fillRect/>
+          </a:stretch>
+        </p:blipFill>
+        <p:spPr>
+          <a:xfrm>
+            <a:off x="3594130" y="2133600"/>
+            <a:ext cx="6905565" cy="3778250"/>
+          </a:xfrm>
+          <a:prstGeom prst="rect">
+            <a:avLst/>
+          </a:prstGeom>
+        </p:spPr>
+      </p:pic>
+    </p:spTree>
+    <p:extLst>
+      <p:ext uri="{BB962C8B-B14F-4D97-AF65-F5344CB8AC3E}">
+        <p14:creationId xmlns:p14="http://schemas.microsoft.com/office/powerpoint/2010/main" val="3632274095"/>
+      </p:ext>
+    </p:extLst>
+  </p:cSld>
+  <p:clrMapOvr>
+    <a:masterClrMapping/>
+  </p:clrMapOvr>
+</p:sld>
+</file>
+
+<file path=ppt/slides/slide22.xml><?xml version="1.0" encoding="utf-8"?>
+<p:sld xmlns:a="http://schemas.openxmlformats.org/drawingml/2006/main" xmlns:r="http://schemas.openxmlformats.org/officeDocument/2006/relationships" xmlns:p="http://schemas.openxmlformats.org/presentationml/2006/main">
+  <p:cSld>
+    <p:bg>
+      <p:bgPr>
+        <a:solidFill>
+          <a:schemeClr val="bg1"/>
+        </a:solidFill>
+        <a:effectLst/>
+      </p:bgPr>
+    </p:bg>
+    <p:spTree>
+      <p:nvGrpSpPr>
+        <p:cNvPr id="1" name=""/>
+        <p:cNvGrpSpPr/>
+        <p:nvPr/>
+      </p:nvGrpSpPr>
+      <p:grpSpPr>
+        <a:xfrm>
+          <a:off x="0" y="0"/>
+          <a:ext cx="0" cy="0"/>
+          <a:chOff x="0" y="0"/>
+          <a:chExt cx="0" cy="0"/>
+        </a:xfrm>
+      </p:grpSpPr>
+      <p:sp useBgFill="1">
+        <p:nvSpPr>
+          <p:cNvPr id="12" name="Rectangle 11">
+            <a:extLst>
+              <a:ext uri="{FF2B5EF4-FFF2-40B4-BE49-F238E27FC236}">
+                <a16:creationId xmlns:a16="http://schemas.microsoft.com/office/drawing/2014/main" id="{35879851-1A1D-4246-AAA1-C484E858337D}"/>
+              </a:ext>
+              <a:ext uri="{C183D7F6-B498-43B3-948B-1728B52AA6E4}">
+                <adec:decorative xmlns:adec="http://schemas.microsoft.com/office/drawing/2017/decorative" val="1"/>
+              </a:ext>
+            </a:extLst>
+          </p:cNvPr>
+          <p:cNvSpPr>
+            <a:spLocks noGrp="1" noRot="1" noChangeAspect="1" noMove="1" noResize="1" noEditPoints="1" noAdjustHandles="1" noChangeArrowheads="1" noChangeShapeType="1" noTextEdit="1"/>
+          </p:cNvSpPr>
+          <p:nvPr>
+            <p:extLst>
+              <p:ext uri="{386F3935-93C4-4BCD-93E2-E3B085C9AB24}">
+                <p16:designElem xmlns:p16="http://schemas.microsoft.com/office/powerpoint/2015/main" val="1"/>
+              </p:ext>
+            </p:extLst>
+          </p:nvPr>
+        </p:nvSpPr>
+        <p:spPr>
+          <a:xfrm>
+            <a:off x="-4189" y="0"/>
+            <a:ext cx="12188952" cy="6858000"/>
+          </a:xfrm>
+          <a:prstGeom prst="rect">
+            <a:avLst/>
+          </a:prstGeom>
+          <a:ln>
+            <a:noFill/>
+          </a:ln>
+        </p:spPr>
+        <p:style>
+          <a:lnRef idx="2">
+            <a:schemeClr val="accent1">
+              <a:shade val="50000"/>
+            </a:schemeClr>
+          </a:lnRef>
+          <a:fillRef idx="1">
+            <a:schemeClr val="accent1"/>
+          </a:fillRef>
+          <a:effectRef idx="0">
+            <a:schemeClr val="accent1"/>
+          </a:effectRef>
+          <a:fontRef idx="minor">
+            <a:schemeClr val="lt1"/>
+          </a:fontRef>
+        </p:style>
+        <p:txBody>
+          <a:bodyPr rtlCol="0" anchor="ctr"/>
+          <a:lstStyle/>
+          <a:p>
+            <a:pPr algn="ctr"/>
+            <a:endParaRPr lang="en-US"/>
+          </a:p>
+        </p:txBody>
+      </p:sp>
+      <p:pic>
+        <p:nvPicPr>
+          <p:cNvPr id="7" name="Content Placeholder 3">
+            <a:extLst>
+              <a:ext uri="{FF2B5EF4-FFF2-40B4-BE49-F238E27FC236}">
+                <a16:creationId xmlns:a16="http://schemas.microsoft.com/office/drawing/2014/main" id="{1C73722A-5FBE-46DA-B318-7BFC32FC7034}"/>
+              </a:ext>
+            </a:extLst>
+          </p:cNvPr>
+          <p:cNvPicPr>
+            <a:picLocks noChangeAspect="1"/>
+          </p:cNvPicPr>
+          <p:nvPr/>
+        </p:nvPicPr>
+        <p:blipFill rotWithShape="1">
+          <a:blip r:embed="rId2">
+            <a:alphaModFix amt="35000"/>
+          </a:blip>
+          <a:srcRect t="3907" b="10215"/>
+          <a:stretch/>
+        </p:blipFill>
+        <p:spPr>
+          <a:xfrm>
+            <a:off x="-8825" y="-5610"/>
+            <a:ext cx="12192000" cy="6858000"/>
+          </a:xfrm>
+          <a:prstGeom prst="rect">
+            <a:avLst/>
+          </a:prstGeom>
+        </p:spPr>
+      </p:pic>
+      <p:sp>
+        <p:nvSpPr>
+          <p:cNvPr id="2" name="Title 1">
+            <a:extLst>
+              <a:ext uri="{FF2B5EF4-FFF2-40B4-BE49-F238E27FC236}">
+                <a16:creationId xmlns:a16="http://schemas.microsoft.com/office/drawing/2014/main" id="{D1D0A241-4470-409E-B0D6-AD4B4A3CABDA}"/>
+              </a:ext>
+            </a:extLst>
+          </p:cNvPr>
+          <p:cNvSpPr>
+            <a:spLocks noGrp="1"/>
+          </p:cNvSpPr>
+          <p:nvPr>
+            <p:ph type="title"/>
+          </p:nvPr>
+        </p:nvSpPr>
+        <p:spPr>
+          <a:xfrm>
+            <a:off x="2592925" y="624110"/>
+            <a:ext cx="8911687" cy="1280890"/>
+          </a:xfrm>
+        </p:spPr>
+        <p:txBody>
+          <a:bodyPr>
+            <a:normAutofit/>
+          </a:bodyPr>
+          <a:lstStyle/>
+          <a:p>
+            <a:r>
+              <a:rPr lang="en-US">
+                <a:solidFill>
+                  <a:srgbClr val="FFFFFF"/>
+                </a:solidFill>
+              </a:rPr>
+              <a:t>Shooting involved?</a:t>
+            </a:r>
+            <a:endParaRPr lang="en-US" dirty="0">
+              <a:solidFill>
+                <a:srgbClr val="FFFFFF"/>
+              </a:solidFill>
+            </a:endParaRPr>
+          </a:p>
+        </p:txBody>
+      </p:sp>
+    </p:spTree>
+    <p:extLst>
+      <p:ext uri="{BB962C8B-B14F-4D97-AF65-F5344CB8AC3E}">
+        <p14:creationId xmlns:p14="http://schemas.microsoft.com/office/powerpoint/2010/main" val="2259571022"/>
+      </p:ext>
+    </p:extLst>
+  </p:cSld>
+  <p:clrMapOvr>
+    <a:overrideClrMapping bg1="dk1" tx1="lt1" bg2="dk2" tx2="lt2" accent1="accent1" accent2="accent2" accent3="accent3" accent4="accent4" accent5="accent5" accent6="accent6" hlink="hlink" folHlink="folHlink"/>
+  </p:clrMapOvr>
+</p:sld>
+</file>
+
+<file path=ppt/slides/slide23.xml><?xml version="1.0" encoding="utf-8"?>
+<p:sld xmlns:a="http://schemas.openxmlformats.org/drawingml/2006/main" xmlns:r="http://schemas.openxmlformats.org/officeDocument/2006/relationships" xmlns:p="http://schemas.openxmlformats.org/presentationml/2006/main">
+  <p:cSld>
+    <p:spTree>
+      <p:nvGrpSpPr>
+        <p:cNvPr id="1" name=""/>
+        <p:cNvGrpSpPr/>
+        <p:nvPr/>
+      </p:nvGrpSpPr>
+      <p:grpSpPr>
+        <a:xfrm>
+          <a:off x="0" y="0"/>
+          <a:ext cx="0" cy="0"/>
+          <a:chOff x="0" y="0"/>
+          <a:chExt cx="0" cy="0"/>
+        </a:xfrm>
+      </p:grpSpPr>
+      <p:sp>
+        <p:nvSpPr>
+          <p:cNvPr id="2" name="Title 1">
+            <a:extLst>
+              <a:ext uri="{FF2B5EF4-FFF2-40B4-BE49-F238E27FC236}">
+                <a16:creationId xmlns:a16="http://schemas.microsoft.com/office/drawing/2014/main" id="{AA7BCB18-7071-4DCD-A568-70D53D346D1F}"/>
+              </a:ext>
+            </a:extLst>
+          </p:cNvPr>
+          <p:cNvSpPr>
+            <a:spLocks noGrp="1"/>
+          </p:cNvSpPr>
+          <p:nvPr>
+            <p:ph type="title"/>
+          </p:nvPr>
+        </p:nvSpPr>
+        <p:spPr/>
+        <p:txBody>
+          <a:bodyPr/>
+          <a:lstStyle/>
+          <a:p>
+            <a:r>
+              <a:rPr lang="en-US" dirty="0"/>
+              <a:t>Overall crime vs Part one crime in a year 2015</a:t>
+            </a:r>
+          </a:p>
+        </p:txBody>
+      </p:sp>
+      <p:sp>
+        <p:nvSpPr>
+          <p:cNvPr id="3" name="Text Placeholder 2">
+            <a:extLst>
+              <a:ext uri="{FF2B5EF4-FFF2-40B4-BE49-F238E27FC236}">
+                <a16:creationId xmlns:a16="http://schemas.microsoft.com/office/drawing/2014/main" id="{C71CB7A5-F5C6-49D9-9CEE-FB3D7E754C18}"/>
+              </a:ext>
+            </a:extLst>
+          </p:cNvPr>
+          <p:cNvSpPr>
+            <a:spLocks noGrp="1"/>
+          </p:cNvSpPr>
+          <p:nvPr>
+            <p:ph type="body" idx="1"/>
+          </p:nvPr>
+        </p:nvSpPr>
+        <p:spPr/>
+        <p:txBody>
+          <a:bodyPr/>
+          <a:lstStyle/>
+          <a:p>
+            <a:r>
+              <a:rPr lang="en-US" dirty="0"/>
+              <a:t>Overall crime	</a:t>
+            </a:r>
+          </a:p>
+        </p:txBody>
+      </p:sp>
+      <p:pic>
+        <p:nvPicPr>
+          <p:cNvPr id="7" name="Content Placeholder 6">
+            <a:extLst>
+              <a:ext uri="{FF2B5EF4-FFF2-40B4-BE49-F238E27FC236}">
+                <a16:creationId xmlns:a16="http://schemas.microsoft.com/office/drawing/2014/main" id="{843AE8FF-1CCA-4A05-88B5-5EDF09C14D10}"/>
+              </a:ext>
+            </a:extLst>
+          </p:cNvPr>
+          <p:cNvPicPr>
+            <a:picLocks noGrp="1" noChangeAspect="1"/>
+          </p:cNvPicPr>
+          <p:nvPr>
+            <p:ph sz="half" idx="2"/>
+          </p:nvPr>
+        </p:nvPicPr>
+        <p:blipFill>
+          <a:blip r:embed="rId2"/>
+          <a:stretch>
+            <a:fillRect/>
+          </a:stretch>
+        </p:blipFill>
+        <p:spPr>
+          <a:xfrm>
+            <a:off x="2589213" y="3111149"/>
+            <a:ext cx="4343400" cy="2229552"/>
+          </a:xfrm>
+          <a:prstGeom prst="rect">
+            <a:avLst/>
+          </a:prstGeom>
+        </p:spPr>
+      </p:pic>
+      <p:sp>
+        <p:nvSpPr>
+          <p:cNvPr id="5" name="Text Placeholder 4">
+            <a:extLst>
+              <a:ext uri="{FF2B5EF4-FFF2-40B4-BE49-F238E27FC236}">
+                <a16:creationId xmlns:a16="http://schemas.microsoft.com/office/drawing/2014/main" id="{BC9D432B-33DA-4719-807A-7AC2026953DE}"/>
+              </a:ext>
+            </a:extLst>
+          </p:cNvPr>
+          <p:cNvSpPr>
+            <a:spLocks noGrp="1"/>
+          </p:cNvSpPr>
+          <p:nvPr>
+            <p:ph type="body" sz="quarter" idx="3"/>
+          </p:nvPr>
+        </p:nvSpPr>
+        <p:spPr/>
+        <p:txBody>
+          <a:bodyPr/>
+          <a:lstStyle/>
+          <a:p>
+            <a:r>
+              <a:rPr lang="en-US" dirty="0"/>
+              <a:t>Part one crime</a:t>
+            </a:r>
+          </a:p>
+        </p:txBody>
+      </p:sp>
+      <p:pic>
+        <p:nvPicPr>
+          <p:cNvPr id="8" name="Content Placeholder 7">
+            <a:extLst>
+              <a:ext uri="{FF2B5EF4-FFF2-40B4-BE49-F238E27FC236}">
+                <a16:creationId xmlns:a16="http://schemas.microsoft.com/office/drawing/2014/main" id="{B3772503-EF46-4617-B28A-71BCD2EDDAFB}"/>
+              </a:ext>
+            </a:extLst>
+          </p:cNvPr>
+          <p:cNvPicPr>
+            <a:picLocks noGrp="1" noChangeAspect="1"/>
+          </p:cNvPicPr>
+          <p:nvPr>
+            <p:ph sz="quarter" idx="4"/>
+          </p:nvPr>
+        </p:nvPicPr>
+        <p:blipFill>
+          <a:blip r:embed="rId3"/>
+          <a:stretch>
+            <a:fillRect/>
+          </a:stretch>
+        </p:blipFill>
+        <p:spPr>
+          <a:xfrm>
+            <a:off x="7167563" y="3133691"/>
+            <a:ext cx="4338637" cy="2178118"/>
+          </a:xfrm>
+          <a:prstGeom prst="rect">
+            <a:avLst/>
+          </a:prstGeom>
+        </p:spPr>
+      </p:pic>
+    </p:spTree>
+    <p:extLst>
+      <p:ext uri="{BB962C8B-B14F-4D97-AF65-F5344CB8AC3E}">
+        <p14:creationId xmlns:p14="http://schemas.microsoft.com/office/powerpoint/2010/main" val="2763760589"/>
+      </p:ext>
+    </p:extLst>
+  </p:cSld>
+  <p:clrMapOvr>
+    <a:masterClrMapping/>
+  </p:clrMapOvr>
+</p:sld>
+</file>
+
+<file path=ppt/slides/slide24.xml><?xml version="1.0" encoding="utf-8"?>
+<p:sld xmlns:a="http://schemas.openxmlformats.org/drawingml/2006/main" xmlns:r="http://schemas.openxmlformats.org/officeDocument/2006/relationships" xmlns:p="http://schemas.openxmlformats.org/presentationml/2006/main">
+  <p:cSld>
+    <p:spTree>
+      <p:nvGrpSpPr>
+        <p:cNvPr id="1" name=""/>
+        <p:cNvGrpSpPr/>
+        <p:nvPr/>
+      </p:nvGrpSpPr>
+      <p:grpSpPr>
+        <a:xfrm>
+          <a:off x="0" y="0"/>
+          <a:ext cx="0" cy="0"/>
+          <a:chOff x="0" y="0"/>
+          <a:chExt cx="0" cy="0"/>
+        </a:xfrm>
+      </p:grpSpPr>
+      <p:sp>
+        <p:nvSpPr>
+          <p:cNvPr id="2" name="Title 1">
+            <a:extLst>
+              <a:ext uri="{FF2B5EF4-FFF2-40B4-BE49-F238E27FC236}">
+                <a16:creationId xmlns:a16="http://schemas.microsoft.com/office/drawing/2014/main" id="{AA7BCB18-7071-4DCD-A568-70D53D346D1F}"/>
+              </a:ext>
+            </a:extLst>
+          </p:cNvPr>
+          <p:cNvSpPr>
+            <a:spLocks noGrp="1"/>
+          </p:cNvSpPr>
+          <p:nvPr>
+            <p:ph type="title"/>
+          </p:nvPr>
+        </p:nvSpPr>
+        <p:spPr/>
+        <p:txBody>
+          <a:bodyPr/>
+          <a:lstStyle/>
+          <a:p>
+            <a:r>
+              <a:rPr lang="en-US" dirty="0"/>
+              <a:t>Overall crime vs Part one crime in a year 2016</a:t>
+            </a:r>
+          </a:p>
+        </p:txBody>
+      </p:sp>
+      <p:sp>
+        <p:nvSpPr>
+          <p:cNvPr id="3" name="Text Placeholder 2">
+            <a:extLst>
+              <a:ext uri="{FF2B5EF4-FFF2-40B4-BE49-F238E27FC236}">
+                <a16:creationId xmlns:a16="http://schemas.microsoft.com/office/drawing/2014/main" id="{C71CB7A5-F5C6-49D9-9CEE-FB3D7E754C18}"/>
+              </a:ext>
+            </a:extLst>
+          </p:cNvPr>
+          <p:cNvSpPr>
+            <a:spLocks noGrp="1"/>
+          </p:cNvSpPr>
+          <p:nvPr>
+            <p:ph type="body" idx="1"/>
+          </p:nvPr>
+        </p:nvSpPr>
+        <p:spPr/>
+        <p:txBody>
+          <a:bodyPr/>
+          <a:lstStyle/>
+          <a:p>
+            <a:r>
+              <a:rPr lang="en-US" dirty="0"/>
+              <a:t>Overall crime	</a:t>
+            </a:r>
+          </a:p>
+        </p:txBody>
+      </p:sp>
+      <p:sp>
+        <p:nvSpPr>
+          <p:cNvPr id="5" name="Text Placeholder 4">
+            <a:extLst>
+              <a:ext uri="{FF2B5EF4-FFF2-40B4-BE49-F238E27FC236}">
+                <a16:creationId xmlns:a16="http://schemas.microsoft.com/office/drawing/2014/main" id="{BC9D432B-33DA-4719-807A-7AC2026953DE}"/>
+              </a:ext>
+            </a:extLst>
+          </p:cNvPr>
+          <p:cNvSpPr>
+            <a:spLocks noGrp="1"/>
+          </p:cNvSpPr>
+          <p:nvPr>
+            <p:ph type="body" sz="quarter" idx="3"/>
+          </p:nvPr>
+        </p:nvSpPr>
+        <p:spPr/>
+        <p:txBody>
+          <a:bodyPr/>
+          <a:lstStyle/>
+          <a:p>
+            <a:r>
+              <a:rPr lang="en-US" dirty="0"/>
+              <a:t>Part one crime</a:t>
+            </a:r>
+          </a:p>
+        </p:txBody>
+      </p:sp>
+      <p:pic>
+        <p:nvPicPr>
+          <p:cNvPr id="10" name="Content Placeholder 9">
+            <a:extLst>
+              <a:ext uri="{FF2B5EF4-FFF2-40B4-BE49-F238E27FC236}">
+                <a16:creationId xmlns:a16="http://schemas.microsoft.com/office/drawing/2014/main" id="{C6064463-1AC7-41F9-B81A-5EBA52B60C92}"/>
+              </a:ext>
+            </a:extLst>
+          </p:cNvPr>
+          <p:cNvPicPr>
+            <a:picLocks noGrp="1" noChangeAspect="1"/>
+          </p:cNvPicPr>
+          <p:nvPr>
+            <p:ph sz="half" idx="2"/>
+          </p:nvPr>
+        </p:nvPicPr>
+        <p:blipFill>
+          <a:blip r:embed="rId2"/>
+          <a:stretch>
+            <a:fillRect/>
+          </a:stretch>
+        </p:blipFill>
+        <p:spPr>
+          <a:xfrm>
+            <a:off x="2589213" y="3179244"/>
+            <a:ext cx="4343400" cy="2093362"/>
+          </a:xfrm>
+          <a:prstGeom prst="rect">
+            <a:avLst/>
+          </a:prstGeom>
+        </p:spPr>
+      </p:pic>
+      <p:pic>
+        <p:nvPicPr>
+          <p:cNvPr id="13" name="Content Placeholder 12">
+            <a:extLst>
+              <a:ext uri="{FF2B5EF4-FFF2-40B4-BE49-F238E27FC236}">
+                <a16:creationId xmlns:a16="http://schemas.microsoft.com/office/drawing/2014/main" id="{535CFF04-0B6B-4542-8CD5-7959CE7763BB}"/>
+              </a:ext>
+            </a:extLst>
+          </p:cNvPr>
+          <p:cNvPicPr>
+            <a:picLocks noGrp="1" noChangeAspect="1"/>
+          </p:cNvPicPr>
+          <p:nvPr>
+            <p:ph sz="quarter" idx="4"/>
+          </p:nvPr>
+        </p:nvPicPr>
+        <p:blipFill>
+          <a:blip r:embed="rId3"/>
+          <a:stretch>
+            <a:fillRect/>
+          </a:stretch>
+        </p:blipFill>
+        <p:spPr>
+          <a:xfrm>
+            <a:off x="7167563" y="3112077"/>
+            <a:ext cx="4338637" cy="2221345"/>
+          </a:xfrm>
+          <a:prstGeom prst="rect">
+            <a:avLst/>
+          </a:prstGeom>
+        </p:spPr>
+      </p:pic>
+    </p:spTree>
+    <p:extLst>
+      <p:ext uri="{BB962C8B-B14F-4D97-AF65-F5344CB8AC3E}">
+        <p14:creationId xmlns:p14="http://schemas.microsoft.com/office/powerpoint/2010/main" val="3058530456"/>
+      </p:ext>
+    </p:extLst>
+  </p:cSld>
+  <p:clrMapOvr>
+    <a:masterClrMapping/>
+  </p:clrMapOvr>
+</p:sld>
+</file>
+
+<file path=ppt/slides/slide25.xml><?xml version="1.0" encoding="utf-8"?>
+<p:sld xmlns:a="http://schemas.openxmlformats.org/drawingml/2006/main" xmlns:r="http://schemas.openxmlformats.org/officeDocument/2006/relationships" xmlns:p="http://schemas.openxmlformats.org/presentationml/2006/main">
+  <p:cSld>
+    <p:spTree>
+      <p:nvGrpSpPr>
+        <p:cNvPr id="1" name=""/>
+        <p:cNvGrpSpPr/>
+        <p:nvPr/>
+      </p:nvGrpSpPr>
+      <p:grpSpPr>
+        <a:xfrm>
+          <a:off x="0" y="0"/>
+          <a:ext cx="0" cy="0"/>
+          <a:chOff x="0" y="0"/>
+          <a:chExt cx="0" cy="0"/>
+        </a:xfrm>
+      </p:grpSpPr>
+      <p:sp>
+        <p:nvSpPr>
+          <p:cNvPr id="2" name="Title 1">
+            <a:extLst>
+              <a:ext uri="{FF2B5EF4-FFF2-40B4-BE49-F238E27FC236}">
+                <a16:creationId xmlns:a16="http://schemas.microsoft.com/office/drawing/2014/main" id="{AA7BCB18-7071-4DCD-A568-70D53D346D1F}"/>
+              </a:ext>
+            </a:extLst>
+          </p:cNvPr>
+          <p:cNvSpPr>
+            <a:spLocks noGrp="1"/>
+          </p:cNvSpPr>
+          <p:nvPr>
+            <p:ph type="title"/>
+          </p:nvPr>
+        </p:nvSpPr>
+        <p:spPr/>
+        <p:txBody>
+          <a:bodyPr/>
+          <a:lstStyle/>
+          <a:p>
+            <a:r>
+              <a:rPr lang="en-US" dirty="0"/>
+              <a:t>Overall crime vs Part one crime in a year 2017	</a:t>
+            </a:r>
+          </a:p>
+        </p:txBody>
+      </p:sp>
+      <p:sp>
+        <p:nvSpPr>
+          <p:cNvPr id="3" name="Text Placeholder 2">
+            <a:extLst>
+              <a:ext uri="{FF2B5EF4-FFF2-40B4-BE49-F238E27FC236}">
+                <a16:creationId xmlns:a16="http://schemas.microsoft.com/office/drawing/2014/main" id="{C71CB7A5-F5C6-49D9-9CEE-FB3D7E754C18}"/>
+              </a:ext>
+            </a:extLst>
+          </p:cNvPr>
+          <p:cNvSpPr>
+            <a:spLocks noGrp="1"/>
+          </p:cNvSpPr>
+          <p:nvPr>
+            <p:ph type="body" idx="1"/>
+          </p:nvPr>
+        </p:nvSpPr>
+        <p:spPr/>
+        <p:txBody>
+          <a:bodyPr/>
+          <a:lstStyle/>
+          <a:p>
+            <a:r>
+              <a:rPr lang="en-US" dirty="0"/>
+              <a:t>Overall crime	</a:t>
+            </a:r>
+          </a:p>
+        </p:txBody>
+      </p:sp>
+      <p:sp>
+        <p:nvSpPr>
+          <p:cNvPr id="5" name="Text Placeholder 4">
+            <a:extLst>
+              <a:ext uri="{FF2B5EF4-FFF2-40B4-BE49-F238E27FC236}">
+                <a16:creationId xmlns:a16="http://schemas.microsoft.com/office/drawing/2014/main" id="{BC9D432B-33DA-4719-807A-7AC2026953DE}"/>
+              </a:ext>
+            </a:extLst>
+          </p:cNvPr>
+          <p:cNvSpPr>
+            <a:spLocks noGrp="1"/>
+          </p:cNvSpPr>
+          <p:nvPr>
+            <p:ph type="body" sz="quarter" idx="3"/>
+          </p:nvPr>
+        </p:nvSpPr>
+        <p:spPr/>
+        <p:txBody>
+          <a:bodyPr/>
+          <a:lstStyle/>
+          <a:p>
+            <a:r>
+              <a:rPr lang="en-US" dirty="0"/>
+              <a:t>Part one crime</a:t>
+            </a:r>
+          </a:p>
+        </p:txBody>
+      </p:sp>
+      <p:pic>
+        <p:nvPicPr>
+          <p:cNvPr id="9" name="Content Placeholder 8">
+            <a:extLst>
+              <a:ext uri="{FF2B5EF4-FFF2-40B4-BE49-F238E27FC236}">
+                <a16:creationId xmlns:a16="http://schemas.microsoft.com/office/drawing/2014/main" id="{16F0D181-921D-4ACE-9CED-9C3C1DCB66CD}"/>
+              </a:ext>
+            </a:extLst>
+          </p:cNvPr>
+          <p:cNvPicPr>
+            <a:picLocks noGrp="1" noChangeAspect="1"/>
+          </p:cNvPicPr>
+          <p:nvPr>
+            <p:ph sz="half" idx="2"/>
+          </p:nvPr>
+        </p:nvPicPr>
+        <p:blipFill>
+          <a:blip r:embed="rId2"/>
+          <a:stretch>
+            <a:fillRect/>
+          </a:stretch>
+        </p:blipFill>
+        <p:spPr>
+          <a:xfrm>
+            <a:off x="2589213" y="3119587"/>
+            <a:ext cx="4343400" cy="2212675"/>
+          </a:xfrm>
+          <a:prstGeom prst="rect">
+            <a:avLst/>
+          </a:prstGeom>
+        </p:spPr>
+      </p:pic>
+      <p:pic>
+        <p:nvPicPr>
+          <p:cNvPr id="11" name="Content Placeholder 10">
+            <a:extLst>
+              <a:ext uri="{FF2B5EF4-FFF2-40B4-BE49-F238E27FC236}">
+                <a16:creationId xmlns:a16="http://schemas.microsoft.com/office/drawing/2014/main" id="{C710294C-2F67-4207-B17F-A3BA100BEBCD}"/>
+              </a:ext>
+            </a:extLst>
+          </p:cNvPr>
+          <p:cNvPicPr>
+            <a:picLocks noGrp="1" noChangeAspect="1"/>
+          </p:cNvPicPr>
+          <p:nvPr>
+            <p:ph sz="quarter" idx="4"/>
+          </p:nvPr>
+        </p:nvPicPr>
+        <p:blipFill>
+          <a:blip r:embed="rId3"/>
+          <a:stretch>
+            <a:fillRect/>
+          </a:stretch>
+        </p:blipFill>
+        <p:spPr>
+          <a:xfrm>
+            <a:off x="7167563" y="3096067"/>
+            <a:ext cx="4338637" cy="2253365"/>
+          </a:xfrm>
+          <a:prstGeom prst="rect">
+            <a:avLst/>
+          </a:prstGeom>
+        </p:spPr>
+      </p:pic>
+    </p:spTree>
+    <p:extLst>
+      <p:ext uri="{BB962C8B-B14F-4D97-AF65-F5344CB8AC3E}">
+        <p14:creationId xmlns:p14="http://schemas.microsoft.com/office/powerpoint/2010/main" val="917885478"/>
+      </p:ext>
+    </p:extLst>
+  </p:cSld>
+  <p:clrMapOvr>
+    <a:masterClrMapping/>
+  </p:clrMapOvr>
+</p:sld>
+</file>
+
+<file path=ppt/slides/slide26.xml><?xml version="1.0" encoding="utf-8"?>
+<p:sld xmlns:a="http://schemas.openxmlformats.org/drawingml/2006/main" xmlns:r="http://schemas.openxmlformats.org/officeDocument/2006/relationships" xmlns:p="http://schemas.openxmlformats.org/presentationml/2006/main">
+  <p:cSld>
+    <p:spTree>
+      <p:nvGrpSpPr>
+        <p:cNvPr id="1" name=""/>
+        <p:cNvGrpSpPr/>
+        <p:nvPr/>
+      </p:nvGrpSpPr>
+      <p:grpSpPr>
+        <a:xfrm>
+          <a:off x="0" y="0"/>
+          <a:ext cx="0" cy="0"/>
+          <a:chOff x="0" y="0"/>
+          <a:chExt cx="0" cy="0"/>
+        </a:xfrm>
+      </p:grpSpPr>
+      <p:sp>
+        <p:nvSpPr>
+          <p:cNvPr id="2" name="Title 1">
+            <a:extLst>
+              <a:ext uri="{FF2B5EF4-FFF2-40B4-BE49-F238E27FC236}">
+                <a16:creationId xmlns:a16="http://schemas.microsoft.com/office/drawing/2014/main" id="{AA7BCB18-7071-4DCD-A568-70D53D346D1F}"/>
+              </a:ext>
+            </a:extLst>
+          </p:cNvPr>
+          <p:cNvSpPr>
+            <a:spLocks noGrp="1"/>
+          </p:cNvSpPr>
+          <p:nvPr>
+            <p:ph type="title"/>
+          </p:nvPr>
+        </p:nvSpPr>
+        <p:spPr/>
+        <p:txBody>
+          <a:bodyPr/>
+          <a:lstStyle/>
+          <a:p>
+            <a:r>
+              <a:rPr lang="en-US" dirty="0"/>
+              <a:t>Overall crime vs Part one crime in a year 2018</a:t>
+            </a:r>
+          </a:p>
+        </p:txBody>
+      </p:sp>
+      <p:sp>
+        <p:nvSpPr>
+          <p:cNvPr id="3" name="Text Placeholder 2">
+            <a:extLst>
+              <a:ext uri="{FF2B5EF4-FFF2-40B4-BE49-F238E27FC236}">
+                <a16:creationId xmlns:a16="http://schemas.microsoft.com/office/drawing/2014/main" id="{C71CB7A5-F5C6-49D9-9CEE-FB3D7E754C18}"/>
+              </a:ext>
+            </a:extLst>
+          </p:cNvPr>
+          <p:cNvSpPr>
+            <a:spLocks noGrp="1"/>
+          </p:cNvSpPr>
+          <p:nvPr>
+            <p:ph type="body" idx="1"/>
+          </p:nvPr>
+        </p:nvSpPr>
+        <p:spPr/>
+        <p:txBody>
+          <a:bodyPr/>
+          <a:lstStyle/>
+          <a:p>
+            <a:r>
+              <a:rPr lang="en-US" dirty="0"/>
+              <a:t>Overall crime	</a:t>
+            </a:r>
+          </a:p>
+        </p:txBody>
+      </p:sp>
+      <p:sp>
+        <p:nvSpPr>
+          <p:cNvPr id="5" name="Text Placeholder 4">
+            <a:extLst>
+              <a:ext uri="{FF2B5EF4-FFF2-40B4-BE49-F238E27FC236}">
+                <a16:creationId xmlns:a16="http://schemas.microsoft.com/office/drawing/2014/main" id="{BC9D432B-33DA-4719-807A-7AC2026953DE}"/>
+              </a:ext>
+            </a:extLst>
+          </p:cNvPr>
+          <p:cNvSpPr>
+            <a:spLocks noGrp="1"/>
+          </p:cNvSpPr>
+          <p:nvPr>
+            <p:ph type="body" sz="quarter" idx="3"/>
+          </p:nvPr>
+        </p:nvSpPr>
+        <p:spPr/>
+        <p:txBody>
+          <a:bodyPr/>
+          <a:lstStyle/>
+          <a:p>
+            <a:r>
+              <a:rPr lang="en-US" dirty="0"/>
+              <a:t>Part one crime</a:t>
+            </a:r>
+          </a:p>
+        </p:txBody>
+      </p:sp>
+      <p:pic>
+        <p:nvPicPr>
+          <p:cNvPr id="10" name="Content Placeholder 9">
+            <a:extLst>
+              <a:ext uri="{FF2B5EF4-FFF2-40B4-BE49-F238E27FC236}">
+                <a16:creationId xmlns:a16="http://schemas.microsoft.com/office/drawing/2014/main" id="{DE9A2A22-DB3C-4E07-8A68-256BA4BE85A1}"/>
+              </a:ext>
+            </a:extLst>
+          </p:cNvPr>
+          <p:cNvPicPr>
+            <a:picLocks noGrp="1" noChangeAspect="1"/>
+          </p:cNvPicPr>
+          <p:nvPr>
+            <p:ph sz="half" idx="2"/>
+          </p:nvPr>
+        </p:nvPicPr>
+        <p:blipFill>
+          <a:blip r:embed="rId2"/>
+          <a:stretch>
+            <a:fillRect/>
+          </a:stretch>
+        </p:blipFill>
+        <p:spPr>
+          <a:xfrm>
+            <a:off x="2589213" y="3143444"/>
+            <a:ext cx="4343400" cy="2164962"/>
+          </a:xfrm>
+          <a:prstGeom prst="rect">
+            <a:avLst/>
+          </a:prstGeom>
+        </p:spPr>
+      </p:pic>
+      <p:pic>
+        <p:nvPicPr>
+          <p:cNvPr id="12" name="Content Placeholder 11">
+            <a:extLst>
+              <a:ext uri="{FF2B5EF4-FFF2-40B4-BE49-F238E27FC236}">
+                <a16:creationId xmlns:a16="http://schemas.microsoft.com/office/drawing/2014/main" id="{748D01DE-702F-430C-9953-DED2709B9CD6}"/>
+              </a:ext>
+            </a:extLst>
+          </p:cNvPr>
+          <p:cNvPicPr>
+            <a:picLocks noGrp="1" noChangeAspect="1"/>
+          </p:cNvPicPr>
+          <p:nvPr>
+            <p:ph sz="quarter" idx="4"/>
+          </p:nvPr>
+        </p:nvPicPr>
+        <p:blipFill>
+          <a:blip r:embed="rId3"/>
+          <a:stretch>
+            <a:fillRect/>
+          </a:stretch>
+        </p:blipFill>
+        <p:spPr>
+          <a:xfrm>
+            <a:off x="7167563" y="3141477"/>
+            <a:ext cx="4338637" cy="2162546"/>
+          </a:xfrm>
+          <a:prstGeom prst="rect">
+            <a:avLst/>
+          </a:prstGeom>
+        </p:spPr>
+      </p:pic>
+    </p:spTree>
+    <p:extLst>
+      <p:ext uri="{BB962C8B-B14F-4D97-AF65-F5344CB8AC3E}">
+        <p14:creationId xmlns:p14="http://schemas.microsoft.com/office/powerpoint/2010/main" val="1305817182"/>
+      </p:ext>
+    </p:extLst>
+  </p:cSld>
+  <p:clrMapOvr>
+    <a:masterClrMapping/>
+  </p:clrMapOvr>
+</p:sld>
+</file>
+
+<file path=ppt/slides/slide27.xml><?xml version="1.0" encoding="utf-8"?>
+<p:sld xmlns:a="http://schemas.openxmlformats.org/drawingml/2006/main" xmlns:r="http://schemas.openxmlformats.org/officeDocument/2006/relationships" xmlns:p="http://schemas.openxmlformats.org/presentationml/2006/main">
+  <p:cSld>
+    <p:spTree>
+      <p:nvGrpSpPr>
+        <p:cNvPr id="1" name=""/>
+        <p:cNvGrpSpPr/>
+        <p:nvPr/>
+      </p:nvGrpSpPr>
+      <p:grpSpPr>
+        <a:xfrm>
+          <a:off x="0" y="0"/>
+          <a:ext cx="0" cy="0"/>
+          <a:chOff x="0" y="0"/>
+          <a:chExt cx="0" cy="0"/>
+        </a:xfrm>
+      </p:grpSpPr>
+      <p:sp>
+        <p:nvSpPr>
+          <p:cNvPr id="2" name="Title 1">
+            <a:extLst>
+              <a:ext uri="{FF2B5EF4-FFF2-40B4-BE49-F238E27FC236}">
+                <a16:creationId xmlns:a16="http://schemas.microsoft.com/office/drawing/2014/main" id="{AA7BCB18-7071-4DCD-A568-70D53D346D1F}"/>
+              </a:ext>
+            </a:extLst>
+          </p:cNvPr>
+          <p:cNvSpPr>
+            <a:spLocks noGrp="1"/>
+          </p:cNvSpPr>
+          <p:nvPr>
+            <p:ph type="title"/>
+          </p:nvPr>
+        </p:nvSpPr>
+        <p:spPr/>
+        <p:txBody>
+          <a:bodyPr/>
+          <a:lstStyle/>
+          <a:p>
+            <a:r>
+              <a:rPr lang="en-US" dirty="0"/>
+              <a:t>Overall crime vs Part one crime in a year 2019</a:t>
+            </a:r>
+          </a:p>
+        </p:txBody>
+      </p:sp>
+      <p:sp>
+        <p:nvSpPr>
+          <p:cNvPr id="3" name="Text Placeholder 2">
+            <a:extLst>
+              <a:ext uri="{FF2B5EF4-FFF2-40B4-BE49-F238E27FC236}">
+                <a16:creationId xmlns:a16="http://schemas.microsoft.com/office/drawing/2014/main" id="{C71CB7A5-F5C6-49D9-9CEE-FB3D7E754C18}"/>
+              </a:ext>
+            </a:extLst>
+          </p:cNvPr>
+          <p:cNvSpPr>
+            <a:spLocks noGrp="1"/>
+          </p:cNvSpPr>
+          <p:nvPr>
+            <p:ph type="body" idx="1"/>
+          </p:nvPr>
+        </p:nvSpPr>
+        <p:spPr/>
+        <p:txBody>
+          <a:bodyPr/>
+          <a:lstStyle/>
+          <a:p>
+            <a:r>
+              <a:rPr lang="en-US" dirty="0"/>
+              <a:t>Overall crime	</a:t>
+            </a:r>
+          </a:p>
+        </p:txBody>
+      </p:sp>
+      <p:sp>
+        <p:nvSpPr>
+          <p:cNvPr id="5" name="Text Placeholder 4">
+            <a:extLst>
+              <a:ext uri="{FF2B5EF4-FFF2-40B4-BE49-F238E27FC236}">
+                <a16:creationId xmlns:a16="http://schemas.microsoft.com/office/drawing/2014/main" id="{BC9D432B-33DA-4719-807A-7AC2026953DE}"/>
+              </a:ext>
+            </a:extLst>
+          </p:cNvPr>
+          <p:cNvSpPr>
+            <a:spLocks noGrp="1"/>
+          </p:cNvSpPr>
+          <p:nvPr>
+            <p:ph type="body" sz="quarter" idx="3"/>
+          </p:nvPr>
+        </p:nvSpPr>
+        <p:spPr/>
+        <p:txBody>
+          <a:bodyPr/>
+          <a:lstStyle/>
+          <a:p>
+            <a:r>
+              <a:rPr lang="en-US" dirty="0"/>
+              <a:t>Part one crime</a:t>
+            </a:r>
+          </a:p>
+        </p:txBody>
+      </p:sp>
+      <p:pic>
+        <p:nvPicPr>
+          <p:cNvPr id="9" name="Content Placeholder 8">
+            <a:extLst>
+              <a:ext uri="{FF2B5EF4-FFF2-40B4-BE49-F238E27FC236}">
+                <a16:creationId xmlns:a16="http://schemas.microsoft.com/office/drawing/2014/main" id="{4F879258-02CB-498F-BA91-91B3A3A637BB}"/>
+              </a:ext>
+            </a:extLst>
+          </p:cNvPr>
+          <p:cNvPicPr>
+            <a:picLocks noGrp="1" noChangeAspect="1"/>
+          </p:cNvPicPr>
+          <p:nvPr>
+            <p:ph sz="half" idx="2"/>
+          </p:nvPr>
+        </p:nvPicPr>
+        <p:blipFill>
+          <a:blip r:embed="rId2"/>
+          <a:stretch>
+            <a:fillRect/>
+          </a:stretch>
+        </p:blipFill>
+        <p:spPr>
+          <a:xfrm>
+            <a:off x="2589213" y="3123091"/>
+            <a:ext cx="4343400" cy="2205668"/>
+          </a:xfrm>
+          <a:prstGeom prst="rect">
+            <a:avLst/>
+          </a:prstGeom>
+        </p:spPr>
+      </p:pic>
+      <p:pic>
+        <p:nvPicPr>
+          <p:cNvPr id="11" name="Content Placeholder 10">
+            <a:extLst>
+              <a:ext uri="{FF2B5EF4-FFF2-40B4-BE49-F238E27FC236}">
+                <a16:creationId xmlns:a16="http://schemas.microsoft.com/office/drawing/2014/main" id="{40933784-343F-45A6-BE60-8BADC91B873C}"/>
+              </a:ext>
+            </a:extLst>
+          </p:cNvPr>
+          <p:cNvPicPr>
+            <a:picLocks noGrp="1" noChangeAspect="1"/>
+          </p:cNvPicPr>
+          <p:nvPr>
+            <p:ph sz="quarter" idx="4"/>
+          </p:nvPr>
+        </p:nvPicPr>
+        <p:blipFill>
+          <a:blip r:embed="rId3"/>
+          <a:stretch>
+            <a:fillRect/>
+          </a:stretch>
+        </p:blipFill>
+        <p:spPr>
+          <a:xfrm>
+            <a:off x="7167563" y="3173364"/>
+            <a:ext cx="4338637" cy="2098771"/>
+          </a:xfrm>
+          <a:prstGeom prst="rect">
+            <a:avLst/>
+          </a:prstGeom>
+        </p:spPr>
+      </p:pic>
+    </p:spTree>
+    <p:extLst>
+      <p:ext uri="{BB962C8B-B14F-4D97-AF65-F5344CB8AC3E}">
+        <p14:creationId xmlns:p14="http://schemas.microsoft.com/office/powerpoint/2010/main" val="2315604558"/>
       </p:ext>
     </p:extLst>
   </p:cSld>

</xml_diff>